<commit_message>
Modified Comparison of Analysis PPT
</commit_message>
<xml_diff>
--- a/7COM1079-Tutorial_4.pptx
+++ b/7COM1079-Tutorial_4.pptx
@@ -1,20 +1,19 @@
 
 <file path=ppt/presentation.xml><?xml version="1.0" encoding="utf-8"?>
-<p:presentation xmlns:a="http://schemas.openxmlformats.org/drawingml/2006/main" xmlns:r="http://schemas.openxmlformats.org/officeDocument/2006/relationships" xmlns:p="http://schemas.openxmlformats.org/presentationml/2006/main" showSpecialPlsOnTitleSld="0" saveSubsetFonts="1">
+<p:presentation xmlns:a="http://schemas.openxmlformats.org/drawingml/2006/main" xmlns:r="http://schemas.openxmlformats.org/officeDocument/2006/relationships" xmlns:p="http://schemas.openxmlformats.org/presentationml/2006/main" showSpecialPlsOnTitleSld="0">
   <p:sldMasterIdLst>
     <p:sldMasterId id="2147483648" r:id="rId1"/>
   </p:sldMasterIdLst>
   <p:notesMasterIdLst>
-    <p:notesMasterId r:id="rId9"/>
+    <p:notesMasterId r:id="rId5"/>
   </p:notesMasterIdLst>
   <p:sldIdLst>
-    <p:sldId id="289" r:id="rId2"/>
-    <p:sldId id="350" r:id="rId3"/>
-    <p:sldId id="336" r:id="rId4"/>
-    <p:sldId id="351" r:id="rId5"/>
-    <p:sldId id="352" r:id="rId6"/>
+    <p:sldId id="289" r:id="rId3"/>
+    <p:sldId id="350" r:id="rId4"/>
+    <p:sldId id="336" r:id="rId6"/>
     <p:sldId id="353" r:id="rId7"/>
-    <p:sldId id="354" r:id="rId8"/>
+    <p:sldId id="355" r:id="rId8"/>
+    <p:sldId id="354" r:id="rId9"/>
   </p:sldIdLst>
   <p:sldSz cx="12192000" cy="6858000"/>
   <p:notesSz cx="6858000" cy="9144000"/>
@@ -113,14 +112,6 @@
       </a:defRPr>
     </a:lvl9pPr>
   </p:defaultTextStyle>
-  <p:extLst>
-    <p:ext uri="{EFAFB233-063F-42B5-8137-9DF3F51BA10A}">
-      <p15:sldGuideLst xmlns:p15="http://schemas.microsoft.com/office/powerpoint/2012/main"/>
-    </p:ext>
-    <p:ext uri="{2D200454-40CA-4A62-9FC3-DE9A4176ACB9}">
-      <p15:notesGuideLst xmlns:p15="http://schemas.microsoft.com/office/powerpoint/2012/main"/>
-    </p:ext>
-  </p:extLst>
 </p:presentation>
 </file>
 
@@ -206,7 +197,6 @@
           <a:p>
             <a:fld id="{AC00C4F1-F02D-4968-BCAA-9FDAC3AA02A7}" type="datetimeFigureOut">
               <a:rPr lang="en-ZA" smtClean="0"/>
-              <a:t>2024/11/15</a:t>
             </a:fld>
             <a:endParaRPr lang="en-ZA"/>
           </a:p>
@@ -273,6 +263,7 @@
               <a:rPr lang="en-US"/>
               <a:t>Click to edit Master text styles</a:t>
             </a:r>
+            <a:endParaRPr lang="en-US"/>
           </a:p>
           <a:p>
             <a:pPr lvl="1"/>
@@ -280,6 +271,7 @@
               <a:rPr lang="en-US"/>
               <a:t>Second level</a:t>
             </a:r>
+            <a:endParaRPr lang="en-US"/>
           </a:p>
           <a:p>
             <a:pPr lvl="2"/>
@@ -287,6 +279,7 @@
               <a:rPr lang="en-US"/>
               <a:t>Third level</a:t>
             </a:r>
+            <a:endParaRPr lang="en-US"/>
           </a:p>
           <a:p>
             <a:pPr lvl="3"/>
@@ -294,6 +287,7 @@
               <a:rPr lang="en-US"/>
               <a:t>Fourth level</a:t>
             </a:r>
+            <a:endParaRPr lang="en-US"/>
           </a:p>
           <a:p>
             <a:pPr lvl="4"/>
@@ -365,18 +359,12 @@
           <a:p>
             <a:fld id="{DCD2AECC-E5D3-43D7-811C-F8588232762B}" type="slidenum">
               <a:rPr lang="en-ZA" smtClean="0"/>
-              <a:t>‹#›</a:t>
             </a:fld>
             <a:endParaRPr lang="en-ZA"/>
           </a:p>
         </p:txBody>
       </p:sp>
     </p:spTree>
-    <p:extLst>
-      <p:ext uri="{BB962C8B-B14F-4D97-AF65-F5344CB8AC3E}">
-        <p14:creationId xmlns:p14="http://schemas.microsoft.com/office/powerpoint/2010/main" val="653674069"/>
-      </p:ext>
-    </p:extLst>
   </p:cSld>
   <p:clrMap bg1="lt1" tx1="dk1" bg2="lt2" tx2="dk2" accent1="accent1" accent2="accent2" accent3="accent3" accent4="accent4" accent5="accent5" accent6="accent6" hlink="hlink" folHlink="folHlink"/>
   <p:notesStyle>
@@ -530,6 +518,7 @@
               <a:rPr lang="en-GB" dirty="0"/>
               <a:t> scale); OR are they just categorical/nominal (Items such as film names, cities, etc., that you can count numbers of occurrences?   You also need to understand whether the variable is either dependent or independent and this will vary according to the context. Independent variables may cause an effect, whereas the dependent variable might be effected by the independent variable.  Check the lecture notes on the RQ for more information and examples.  </a:t>
             </a:r>
+            <a:endParaRPr lang="en-GB" dirty="0"/>
           </a:p>
           <a:p>
             <a:endParaRPr lang="en-GB" dirty="0"/>
@@ -539,6 +528,7 @@
               <a:rPr lang="en-GB" dirty="0"/>
               <a:t>You will get only one opportunity to present your Research Question ahead of the submission date.  Have your questions ready, and be ready to take notes on feedback.</a:t>
             </a:r>
+            <a:endParaRPr lang="en-GB" dirty="0"/>
           </a:p>
         </p:txBody>
       </p:sp>
@@ -559,19 +549,12 @@
           <a:p>
             <a:fld id="{30370952-48CC-46D7-9FCD-59FAD40CC025}" type="slidenum">
               <a:rPr lang="en-GB" smtClean="0"/>
-              <a:pPr/>
-              <a:t>2</a:t>
             </a:fld>
             <a:endParaRPr lang="en-GB"/>
           </a:p>
         </p:txBody>
       </p:sp>
     </p:spTree>
-    <p:extLst>
-      <p:ext uri="{BB962C8B-B14F-4D97-AF65-F5344CB8AC3E}">
-        <p14:creationId xmlns:p14="http://schemas.microsoft.com/office/powerpoint/2010/main" val="2905941406"/>
-      </p:ext>
-    </p:extLst>
   </p:cSld>
   <p:clrMapOvr>
     <a:masterClrMapping/>
@@ -644,19 +627,12 @@
           <a:p>
             <a:fld id="{30370952-48CC-46D7-9FCD-59FAD40CC025}" type="slidenum">
               <a:rPr lang="en-GB" smtClean="0"/>
-              <a:pPr/>
-              <a:t>3</a:t>
             </a:fld>
             <a:endParaRPr lang="en-GB"/>
           </a:p>
         </p:txBody>
       </p:sp>
     </p:spTree>
-    <p:extLst>
-      <p:ext uri="{BB962C8B-B14F-4D97-AF65-F5344CB8AC3E}">
-        <p14:creationId xmlns:p14="http://schemas.microsoft.com/office/powerpoint/2010/main" val="2667984944"/>
-      </p:ext>
-    </p:extLst>
   </p:cSld>
   <p:clrMapOvr>
     <a:masterClrMapping/>
@@ -683,13 +659,7 @@
       </p:grpSpPr>
       <p:sp>
         <p:nvSpPr>
-          <p:cNvPr id="3" name="Content Placeholder 2">
-            <a:extLst>
-              <a:ext uri="{FF2B5EF4-FFF2-40B4-BE49-F238E27FC236}">
-                <a16:creationId xmlns:a16="http://schemas.microsoft.com/office/drawing/2014/main" id="{698CC025-4217-2F1B-5C7F-FE23DEA9CEA6}"/>
-              </a:ext>
-            </a:extLst>
-          </p:cNvPr>
+          <p:cNvPr id="3" name="Content Placeholder 2"/>
           <p:cNvSpPr>
             <a:spLocks noGrp="1"/>
           </p:cNvSpPr>
@@ -707,6 +677,7 @@
               <a:rPr lang="en-GB"/>
               <a:t>Click to edit Master text styles</a:t>
             </a:r>
+            <a:endParaRPr lang="en-GB"/>
           </a:p>
           <a:p>
             <a:pPr lvl="1"/>
@@ -714,6 +685,7 @@
               <a:rPr lang="en-GB"/>
               <a:t>Second level</a:t>
             </a:r>
+            <a:endParaRPr lang="en-GB"/>
           </a:p>
           <a:p>
             <a:pPr lvl="2"/>
@@ -721,6 +693,7 @@
               <a:rPr lang="en-GB"/>
               <a:t>Third level</a:t>
             </a:r>
+            <a:endParaRPr lang="en-GB"/>
           </a:p>
           <a:p>
             <a:pPr lvl="3"/>
@@ -728,6 +701,7 @@
               <a:rPr lang="en-GB"/>
               <a:t>Fourth level</a:t>
             </a:r>
+            <a:endParaRPr lang="en-GB"/>
           </a:p>
           <a:p>
             <a:pPr lvl="4"/>
@@ -735,18 +709,13 @@
               <a:rPr lang="en-GB"/>
               <a:t>Fifth level</a:t>
             </a:r>
-          </a:p>
-        </p:txBody>
-      </p:sp>
-      <p:sp>
-        <p:nvSpPr>
-          <p:cNvPr id="7" name="Date Placeholder 6">
-            <a:extLst>
-              <a:ext uri="{FF2B5EF4-FFF2-40B4-BE49-F238E27FC236}">
-                <a16:creationId xmlns:a16="http://schemas.microsoft.com/office/drawing/2014/main" id="{2FC96069-04DB-EF60-1E86-5AC377E0B2D4}"/>
-              </a:ext>
-            </a:extLst>
-          </p:cNvPr>
+            <a:endParaRPr lang="en-GB"/>
+          </a:p>
+        </p:txBody>
+      </p:sp>
+      <p:sp>
+        <p:nvSpPr>
+          <p:cNvPr id="7" name="Date Placeholder 6"/>
           <p:cNvSpPr>
             <a:spLocks noGrp="1"/>
           </p:cNvSpPr>
@@ -761,7 +730,6 @@
           <a:p>
             <a:fld id="{404C13FC-49E0-444A-814B-46496F7D36F0}" type="datetime1">
               <a:rPr lang="en-US" smtClean="0"/>
-              <a:t>11/15/2024</a:t>
             </a:fld>
             <a:endParaRPr lang="en-GB"/>
           </a:p>
@@ -769,13 +737,7 @@
       </p:sp>
       <p:sp>
         <p:nvSpPr>
-          <p:cNvPr id="8" name="Footer Placeholder 7">
-            <a:extLst>
-              <a:ext uri="{FF2B5EF4-FFF2-40B4-BE49-F238E27FC236}">
-                <a16:creationId xmlns:a16="http://schemas.microsoft.com/office/drawing/2014/main" id="{6FC45478-BEB4-5DAC-BD0D-313A593A7A0F}"/>
-              </a:ext>
-            </a:extLst>
-          </p:cNvPr>
+          <p:cNvPr id="8" name="Footer Placeholder 7"/>
           <p:cNvSpPr>
             <a:spLocks noGrp="1"/>
           </p:cNvSpPr>
@@ -792,18 +754,13 @@
               <a:rPr lang="en-GB"/>
               <a:t>7COM1079</a:t>
             </a:r>
-          </a:p>
-        </p:txBody>
-      </p:sp>
-      <p:sp>
-        <p:nvSpPr>
-          <p:cNvPr id="9" name="Slide Number Placeholder 8">
-            <a:extLst>
-              <a:ext uri="{FF2B5EF4-FFF2-40B4-BE49-F238E27FC236}">
-                <a16:creationId xmlns:a16="http://schemas.microsoft.com/office/drawing/2014/main" id="{D8405B57-003C-B14F-EBE5-6A2BBCDCAA35}"/>
-              </a:ext>
-            </a:extLst>
-          </p:cNvPr>
+            <a:endParaRPr lang="en-GB"/>
+          </a:p>
+        </p:txBody>
+      </p:sp>
+      <p:sp>
+        <p:nvSpPr>
+          <p:cNvPr id="9" name="Slide Number Placeholder 8"/>
           <p:cNvSpPr>
             <a:spLocks noGrp="1"/>
           </p:cNvSpPr>
@@ -818,7 +775,6 @@
           <a:p>
             <a:fld id="{02CD70DB-B21E-44B2-9A09-6D53D13DA6DB}" type="slidenum">
               <a:rPr lang="en-GB" smtClean="0"/>
-              <a:t>‹#›</a:t>
             </a:fld>
             <a:endParaRPr lang="en-GB"/>
           </a:p>
@@ -826,13 +782,7 @@
       </p:sp>
       <p:sp>
         <p:nvSpPr>
-          <p:cNvPr id="10" name="Title 9">
-            <a:extLst>
-              <a:ext uri="{FF2B5EF4-FFF2-40B4-BE49-F238E27FC236}">
-                <a16:creationId xmlns:a16="http://schemas.microsoft.com/office/drawing/2014/main" id="{E6F1A110-F563-32E4-5A9A-6FBDDC999B18}"/>
-              </a:ext>
-            </a:extLst>
-          </p:cNvPr>
+          <p:cNvPr id="10" name="Title 9"/>
           <p:cNvSpPr>
             <a:spLocks noGrp="1"/>
           </p:cNvSpPr>
@@ -855,13 +805,7 @@
       </p:sp>
       <p:sp>
         <p:nvSpPr>
-          <p:cNvPr id="12" name="Text Placeholder 11">
-            <a:extLst>
-              <a:ext uri="{FF2B5EF4-FFF2-40B4-BE49-F238E27FC236}">
-                <a16:creationId xmlns:a16="http://schemas.microsoft.com/office/drawing/2014/main" id="{6B678934-48F6-41C9-5B12-57D509A8C78E}"/>
-              </a:ext>
-            </a:extLst>
-          </p:cNvPr>
+          <p:cNvPr id="12" name="Text Placeholder 11"/>
           <p:cNvSpPr>
             <a:spLocks noGrp="1"/>
           </p:cNvSpPr>
@@ -884,6 +828,7 @@
               <a:rPr lang="en-US"/>
               <a:t>Click to edit Master text styles</a:t>
             </a:r>
+            <a:endParaRPr lang="en-US"/>
           </a:p>
           <a:p>
             <a:pPr lvl="1"/>
@@ -891,6 +836,7 @@
               <a:rPr lang="en-US"/>
               <a:t>Second level</a:t>
             </a:r>
+            <a:endParaRPr lang="en-US"/>
           </a:p>
           <a:p>
             <a:pPr lvl="2"/>
@@ -898,6 +844,7 @@
               <a:rPr lang="en-US"/>
               <a:t>Third level</a:t>
             </a:r>
+            <a:endParaRPr lang="en-US"/>
           </a:p>
           <a:p>
             <a:pPr lvl="3"/>
@@ -905,6 +852,7 @@
               <a:rPr lang="en-US"/>
               <a:t>Fourth level</a:t>
             </a:r>
+            <a:endParaRPr lang="en-US"/>
           </a:p>
           <a:p>
             <a:pPr lvl="4"/>
@@ -917,11 +865,6 @@
         </p:txBody>
       </p:sp>
     </p:spTree>
-    <p:extLst>
-      <p:ext uri="{BB962C8B-B14F-4D97-AF65-F5344CB8AC3E}">
-        <p14:creationId xmlns:p14="http://schemas.microsoft.com/office/powerpoint/2010/main" val="1563798878"/>
-      </p:ext>
-    </p:extLst>
   </p:cSld>
   <p:clrMapOvr>
     <a:masterClrMapping/>
@@ -948,13 +891,7 @@
       </p:grpSpPr>
       <p:sp>
         <p:nvSpPr>
-          <p:cNvPr id="2" name="Title 1">
-            <a:extLst>
-              <a:ext uri="{FF2B5EF4-FFF2-40B4-BE49-F238E27FC236}">
-                <a16:creationId xmlns:a16="http://schemas.microsoft.com/office/drawing/2014/main" id="{F95752A8-2060-AC42-7BA9-C5AE952A39C5}"/>
-              </a:ext>
-            </a:extLst>
-          </p:cNvPr>
+          <p:cNvPr id="2" name="Title 1"/>
           <p:cNvSpPr>
             <a:spLocks noGrp="1"/>
           </p:cNvSpPr>
@@ -977,13 +914,7 @@
       </p:sp>
       <p:sp>
         <p:nvSpPr>
-          <p:cNvPr id="3" name="Date Placeholder 2">
-            <a:extLst>
-              <a:ext uri="{FF2B5EF4-FFF2-40B4-BE49-F238E27FC236}">
-                <a16:creationId xmlns:a16="http://schemas.microsoft.com/office/drawing/2014/main" id="{E3957FCA-752D-9673-941A-11D6F457D77B}"/>
-              </a:ext>
-            </a:extLst>
-          </p:cNvPr>
+          <p:cNvPr id="3" name="Date Placeholder 2"/>
           <p:cNvSpPr>
             <a:spLocks noGrp="1"/>
           </p:cNvSpPr>
@@ -998,7 +929,6 @@
           <a:p>
             <a:fld id="{F4668FC0-4332-488E-85C9-27A33E5E8D39}" type="datetime1">
               <a:rPr lang="en-US" smtClean="0"/>
-              <a:t>11/15/2024</a:t>
             </a:fld>
             <a:endParaRPr lang="en-GB"/>
           </a:p>
@@ -1006,13 +936,7 @@
       </p:sp>
       <p:sp>
         <p:nvSpPr>
-          <p:cNvPr id="4" name="Footer Placeholder 3">
-            <a:extLst>
-              <a:ext uri="{FF2B5EF4-FFF2-40B4-BE49-F238E27FC236}">
-                <a16:creationId xmlns:a16="http://schemas.microsoft.com/office/drawing/2014/main" id="{5B8B4910-D03F-502E-959D-F38B182F80F0}"/>
-              </a:ext>
-            </a:extLst>
-          </p:cNvPr>
+          <p:cNvPr id="4" name="Footer Placeholder 3"/>
           <p:cNvSpPr>
             <a:spLocks noGrp="1"/>
           </p:cNvSpPr>
@@ -1029,18 +953,13 @@
               <a:rPr lang="en-GB"/>
               <a:t>7COM1079</a:t>
             </a:r>
-          </a:p>
-        </p:txBody>
-      </p:sp>
-      <p:sp>
-        <p:nvSpPr>
-          <p:cNvPr id="5" name="Slide Number Placeholder 4">
-            <a:extLst>
-              <a:ext uri="{FF2B5EF4-FFF2-40B4-BE49-F238E27FC236}">
-                <a16:creationId xmlns:a16="http://schemas.microsoft.com/office/drawing/2014/main" id="{E9973C12-FC3E-B1E6-B825-A9474030D1EE}"/>
-              </a:ext>
-            </a:extLst>
-          </p:cNvPr>
+            <a:endParaRPr lang="en-GB"/>
+          </a:p>
+        </p:txBody>
+      </p:sp>
+      <p:sp>
+        <p:nvSpPr>
+          <p:cNvPr id="5" name="Slide Number Placeholder 4"/>
           <p:cNvSpPr>
             <a:spLocks noGrp="1"/>
           </p:cNvSpPr>
@@ -1055,18 +974,12 @@
           <a:p>
             <a:fld id="{02CD70DB-B21E-44B2-9A09-6D53D13DA6DB}" type="slidenum">
               <a:rPr lang="en-GB" smtClean="0"/>
-              <a:t>‹#›</a:t>
             </a:fld>
             <a:endParaRPr lang="en-GB"/>
           </a:p>
         </p:txBody>
       </p:sp>
     </p:spTree>
-    <p:extLst>
-      <p:ext uri="{BB962C8B-B14F-4D97-AF65-F5344CB8AC3E}">
-        <p14:creationId xmlns:p14="http://schemas.microsoft.com/office/powerpoint/2010/main" val="3739230994"/>
-      </p:ext>
-    </p:extLst>
   </p:cSld>
   <p:clrMapOvr>
     <a:masterClrMapping/>
@@ -1101,13 +1014,7 @@
       </p:grpSpPr>
       <p:sp>
         <p:nvSpPr>
-          <p:cNvPr id="3" name="Subtitle 2">
-            <a:extLst>
-              <a:ext uri="{FF2B5EF4-FFF2-40B4-BE49-F238E27FC236}">
-                <a16:creationId xmlns:a16="http://schemas.microsoft.com/office/drawing/2014/main" id="{E2C6B9F5-608F-4534-96F0-C3A5E1A638A6}"/>
-              </a:ext>
-            </a:extLst>
-          </p:cNvPr>
+          <p:cNvPr id="3" name="Subtitle 2"/>
           <p:cNvSpPr>
             <a:spLocks noGrp="1"/>
           </p:cNvSpPr>
@@ -1178,13 +1085,7 @@
       </p:sp>
       <p:sp>
         <p:nvSpPr>
-          <p:cNvPr id="5" name="Footer Placeholder 4">
-            <a:extLst>
-              <a:ext uri="{FF2B5EF4-FFF2-40B4-BE49-F238E27FC236}">
-                <a16:creationId xmlns:a16="http://schemas.microsoft.com/office/drawing/2014/main" id="{0540E7B9-9AC6-4E42-A931-6FF91E6494A1}"/>
-              </a:ext>
-            </a:extLst>
-          </p:cNvPr>
+          <p:cNvPr id="5" name="Footer Placeholder 4"/>
           <p:cNvSpPr>
             <a:spLocks noGrp="1"/>
           </p:cNvSpPr>
@@ -1216,18 +1117,13 @@
               <a:rPr lang="en-GB" dirty="0"/>
               <a:t>PRESENTATION TITLE (ADD VIA INSERT, HEADER &amp; FOOTER)</a:t>
             </a:r>
-          </a:p>
-        </p:txBody>
-      </p:sp>
-      <p:sp>
-        <p:nvSpPr>
-          <p:cNvPr id="6" name="Slide Number Placeholder 5">
-            <a:extLst>
-              <a:ext uri="{FF2B5EF4-FFF2-40B4-BE49-F238E27FC236}">
-                <a16:creationId xmlns:a16="http://schemas.microsoft.com/office/drawing/2014/main" id="{FB16D645-6420-4785-8316-43EF780FA589}"/>
-              </a:ext>
-            </a:extLst>
-          </p:cNvPr>
+            <a:endParaRPr lang="en-GB" dirty="0"/>
+          </a:p>
+        </p:txBody>
+      </p:sp>
+      <p:sp>
+        <p:nvSpPr>
+          <p:cNvPr id="6" name="Slide Number Placeholder 5"/>
           <p:cNvSpPr>
             <a:spLocks noGrp="1"/>
           </p:cNvSpPr>
@@ -1257,8 +1153,6 @@
           <a:p>
             <a:fld id="{E4D355CA-84B7-41B1-B164-8BB439CC7C6B}" type="slidenum">
               <a:rPr lang="en-GB" smtClean="0"/>
-              <a:pPr/>
-              <a:t>‹#›</a:t>
             </a:fld>
             <a:endParaRPr lang="en-GB" dirty="0"/>
           </a:p>
@@ -1266,13 +1160,7 @@
       </p:sp>
       <p:sp>
         <p:nvSpPr>
-          <p:cNvPr id="9" name="Title 1">
-            <a:extLst>
-              <a:ext uri="{FF2B5EF4-FFF2-40B4-BE49-F238E27FC236}">
-                <a16:creationId xmlns:a16="http://schemas.microsoft.com/office/drawing/2014/main" id="{E9449821-0D0D-644D-97A3-D56097A9C6DA}"/>
-              </a:ext>
-            </a:extLst>
-          </p:cNvPr>
+          <p:cNvPr id="9" name="Title 1"/>
           <p:cNvSpPr>
             <a:spLocks noGrp="1"/>
           </p:cNvSpPr>
@@ -1313,13 +1201,7 @@
       </p:sp>
       <p:sp>
         <p:nvSpPr>
-          <p:cNvPr id="10" name="Rectangle 9">
-            <a:extLst>
-              <a:ext uri="{FF2B5EF4-FFF2-40B4-BE49-F238E27FC236}">
-                <a16:creationId xmlns:a16="http://schemas.microsoft.com/office/drawing/2014/main" id="{44F6EB17-8019-7B4E-B53C-76B057A7C31F}"/>
-              </a:ext>
-            </a:extLst>
-          </p:cNvPr>
+          <p:cNvPr id="10" name="Rectangle 9"/>
           <p:cNvSpPr/>
           <p:nvPr userDrawn="1"/>
         </p:nvSpPr>
@@ -1369,13 +1251,7 @@
       </p:sp>
       <p:pic>
         <p:nvPicPr>
-          <p:cNvPr id="11" name="Picture 10">
-            <a:extLst>
-              <a:ext uri="{FF2B5EF4-FFF2-40B4-BE49-F238E27FC236}">
-                <a16:creationId xmlns:a16="http://schemas.microsoft.com/office/drawing/2014/main" id="{0503EF50-F00F-9643-BE53-F0A5272FC4B2}"/>
-              </a:ext>
-            </a:extLst>
-          </p:cNvPr>
+          <p:cNvPr id="11" name="Picture 10"/>
           <p:cNvPicPr>
             <a:picLocks noChangeAspect="1"/>
           </p:cNvPicPr>
@@ -1398,11 +1274,6 @@
         </p:spPr>
       </p:pic>
     </p:spTree>
-    <p:extLst>
-      <p:ext uri="{BB962C8B-B14F-4D97-AF65-F5344CB8AC3E}">
-        <p14:creationId xmlns:p14="http://schemas.microsoft.com/office/powerpoint/2010/main" val="371129068"/>
-      </p:ext>
-    </p:extLst>
   </p:cSld>
   <p:clrMapOvr>
     <a:masterClrMapping/>
@@ -1437,13 +1308,7 @@
       </p:grpSpPr>
       <p:sp>
         <p:nvSpPr>
-          <p:cNvPr id="2" name="Title 1">
-            <a:extLst>
-              <a:ext uri="{FF2B5EF4-FFF2-40B4-BE49-F238E27FC236}">
-                <a16:creationId xmlns:a16="http://schemas.microsoft.com/office/drawing/2014/main" id="{7381B53D-9933-445F-9B68-E730EB38A5A9}"/>
-              </a:ext>
-            </a:extLst>
-          </p:cNvPr>
+          <p:cNvPr id="2" name="Title 1"/>
           <p:cNvSpPr>
             <a:spLocks noGrp="1"/>
           </p:cNvSpPr>
@@ -1484,13 +1349,7 @@
       </p:sp>
       <p:sp>
         <p:nvSpPr>
-          <p:cNvPr id="3" name="Subtitle 2">
-            <a:extLst>
-              <a:ext uri="{FF2B5EF4-FFF2-40B4-BE49-F238E27FC236}">
-                <a16:creationId xmlns:a16="http://schemas.microsoft.com/office/drawing/2014/main" id="{E2C6B9F5-608F-4534-96F0-C3A5E1A638A6}"/>
-              </a:ext>
-            </a:extLst>
-          </p:cNvPr>
+          <p:cNvPr id="3" name="Subtitle 2"/>
           <p:cNvSpPr>
             <a:spLocks noGrp="1"/>
           </p:cNvSpPr>
@@ -1561,13 +1420,7 @@
       </p:sp>
       <p:sp>
         <p:nvSpPr>
-          <p:cNvPr id="5" name="Footer Placeholder 4">
-            <a:extLst>
-              <a:ext uri="{FF2B5EF4-FFF2-40B4-BE49-F238E27FC236}">
-                <a16:creationId xmlns:a16="http://schemas.microsoft.com/office/drawing/2014/main" id="{0540E7B9-9AC6-4E42-A931-6FF91E6494A1}"/>
-              </a:ext>
-            </a:extLst>
-          </p:cNvPr>
+          <p:cNvPr id="5" name="Footer Placeholder 4"/>
           <p:cNvSpPr>
             <a:spLocks noGrp="1"/>
           </p:cNvSpPr>
@@ -1609,13 +1462,7 @@
       </p:sp>
       <p:sp>
         <p:nvSpPr>
-          <p:cNvPr id="6" name="Slide Number Placeholder 5">
-            <a:extLst>
-              <a:ext uri="{FF2B5EF4-FFF2-40B4-BE49-F238E27FC236}">
-                <a16:creationId xmlns:a16="http://schemas.microsoft.com/office/drawing/2014/main" id="{FB16D645-6420-4785-8316-43EF780FA589}"/>
-              </a:ext>
-            </a:extLst>
-          </p:cNvPr>
+          <p:cNvPr id="6" name="Slide Number Placeholder 5"/>
           <p:cNvSpPr>
             <a:spLocks noGrp="1"/>
           </p:cNvSpPr>
@@ -1645,8 +1492,6 @@
           <a:p>
             <a:fld id="{E4D355CA-84B7-41B1-B164-8BB439CC7C6B}" type="slidenum">
               <a:rPr lang="en-GB" smtClean="0"/>
-              <a:pPr/>
-              <a:t>‹#›</a:t>
             </a:fld>
             <a:endParaRPr lang="en-GB" dirty="0"/>
           </a:p>
@@ -1654,26 +1499,14 @@
       </p:sp>
       <p:pic>
         <p:nvPicPr>
-          <p:cNvPr id="8" name="Picture 7" descr="A picture containing drawing&#10;&#10;Description automatically generated">
-            <a:extLst>
-              <a:ext uri="{FF2B5EF4-FFF2-40B4-BE49-F238E27FC236}">
-                <a16:creationId xmlns:a16="http://schemas.microsoft.com/office/drawing/2014/main" id="{BCCF2CA0-CCE3-4304-8F31-4D1CC50BCBDE}"/>
-              </a:ext>
-            </a:extLst>
-          </p:cNvPr>
+          <p:cNvPr id="8" name="Picture 7" descr="A picture containing drawing&#10;&#10;Description automatically generated"/>
           <p:cNvPicPr>
             <a:picLocks noChangeAspect="1"/>
           </p:cNvPicPr>
           <p:nvPr userDrawn="1"/>
         </p:nvPicPr>
         <p:blipFill>
-          <a:blip r:embed="rId2" cstate="print">
-            <a:extLst>
-              <a:ext uri="{28A0092B-C50C-407E-A947-70E740481C1C}">
-                <a14:useLocalDpi xmlns:a14="http://schemas.microsoft.com/office/drawing/2010/main"/>
-              </a:ext>
-            </a:extLst>
-          </a:blip>
+          <a:blip r:embed="rId2" cstate="print"/>
           <a:stretch>
             <a:fillRect/>
           </a:stretch>
@@ -1689,11 +1522,6 @@
         </p:spPr>
       </p:pic>
     </p:spTree>
-    <p:extLst>
-      <p:ext uri="{BB962C8B-B14F-4D97-AF65-F5344CB8AC3E}">
-        <p14:creationId xmlns:p14="http://schemas.microsoft.com/office/powerpoint/2010/main" val="446063952"/>
-      </p:ext>
-    </p:extLst>
   </p:cSld>
   <p:clrMapOvr>
     <a:masterClrMapping/>
@@ -1725,13 +1553,7 @@
       </p:grpSpPr>
       <p:sp>
         <p:nvSpPr>
-          <p:cNvPr id="2" name="Title Placeholder 1">
-            <a:extLst>
-              <a:ext uri="{FF2B5EF4-FFF2-40B4-BE49-F238E27FC236}">
-                <a16:creationId xmlns:a16="http://schemas.microsoft.com/office/drawing/2014/main" id="{683FAF85-2271-2412-0D39-84F34F312952}"/>
-              </a:ext>
-            </a:extLst>
-          </p:cNvPr>
+          <p:cNvPr id="2" name="Title Placeholder 1"/>
           <p:cNvSpPr>
             <a:spLocks noGrp="1"/>
           </p:cNvSpPr>
@@ -1758,18 +1580,13 @@
               <a:rPr lang="en-GB"/>
               <a:t>Click to edit Master title style</a:t>
             </a:r>
-          </a:p>
-        </p:txBody>
-      </p:sp>
-      <p:sp>
-        <p:nvSpPr>
-          <p:cNvPr id="3" name="Text Placeholder 2">
-            <a:extLst>
-              <a:ext uri="{FF2B5EF4-FFF2-40B4-BE49-F238E27FC236}">
-                <a16:creationId xmlns:a16="http://schemas.microsoft.com/office/drawing/2014/main" id="{CBFD92C1-9D26-2929-CEB8-3D43F718B632}"/>
-              </a:ext>
-            </a:extLst>
-          </p:cNvPr>
+            <a:endParaRPr lang="en-GB"/>
+          </a:p>
+        </p:txBody>
+      </p:sp>
+      <p:sp>
+        <p:nvSpPr>
+          <p:cNvPr id="3" name="Text Placeholder 2"/>
           <p:cNvSpPr>
             <a:spLocks noGrp="1"/>
           </p:cNvSpPr>
@@ -1797,6 +1614,7 @@
               <a:rPr lang="en-GB"/>
               <a:t>Click to edit Master text styles</a:t>
             </a:r>
+            <a:endParaRPr lang="en-GB"/>
           </a:p>
           <a:p>
             <a:pPr lvl="1"/>
@@ -1804,6 +1622,7 @@
               <a:rPr lang="en-GB"/>
               <a:t>Second level</a:t>
             </a:r>
+            <a:endParaRPr lang="en-GB"/>
           </a:p>
           <a:p>
             <a:pPr lvl="2"/>
@@ -1811,6 +1630,7 @@
               <a:rPr lang="en-GB"/>
               <a:t>Third level</a:t>
             </a:r>
+            <a:endParaRPr lang="en-GB"/>
           </a:p>
           <a:p>
             <a:pPr lvl="3"/>
@@ -1818,6 +1638,7 @@
               <a:rPr lang="en-GB"/>
               <a:t>Fourth level</a:t>
             </a:r>
+            <a:endParaRPr lang="en-GB"/>
           </a:p>
           <a:p>
             <a:pPr lvl="4"/>
@@ -1825,18 +1646,13 @@
               <a:rPr lang="en-GB"/>
               <a:t>Fifth level</a:t>
             </a:r>
-          </a:p>
-        </p:txBody>
-      </p:sp>
-      <p:sp>
-        <p:nvSpPr>
-          <p:cNvPr id="4" name="Date Placeholder 3">
-            <a:extLst>
-              <a:ext uri="{FF2B5EF4-FFF2-40B4-BE49-F238E27FC236}">
-                <a16:creationId xmlns:a16="http://schemas.microsoft.com/office/drawing/2014/main" id="{02366CEC-97C7-846C-8408-07E277AB2417}"/>
-              </a:ext>
-            </a:extLst>
-          </p:cNvPr>
+            <a:endParaRPr lang="en-GB"/>
+          </a:p>
+        </p:txBody>
+      </p:sp>
+      <p:sp>
+        <p:nvSpPr>
+          <p:cNvPr id="4" name="Date Placeholder 3"/>
           <p:cNvSpPr>
             <a:spLocks noGrp="1"/>
           </p:cNvSpPr>
@@ -1869,7 +1685,6 @@
           <a:p>
             <a:fld id="{74C9CA7B-D094-42A4-A24F-8B96B7DD1BC1}" type="datetime1">
               <a:rPr lang="en-US" smtClean="0"/>
-              <a:t>11/15/2024</a:t>
             </a:fld>
             <a:endParaRPr lang="en-GB"/>
           </a:p>
@@ -1877,13 +1692,7 @@
       </p:sp>
       <p:sp>
         <p:nvSpPr>
-          <p:cNvPr id="5" name="Footer Placeholder 4">
-            <a:extLst>
-              <a:ext uri="{FF2B5EF4-FFF2-40B4-BE49-F238E27FC236}">
-                <a16:creationId xmlns:a16="http://schemas.microsoft.com/office/drawing/2014/main" id="{0CCA908A-A4E4-1B19-F2D1-BE7DB4F7E868}"/>
-              </a:ext>
-            </a:extLst>
-          </p:cNvPr>
+          <p:cNvPr id="5" name="Footer Placeholder 4"/>
           <p:cNvSpPr>
             <a:spLocks noGrp="1"/>
           </p:cNvSpPr>
@@ -1918,18 +1727,13 @@
               <a:rPr lang="en-GB"/>
               <a:t>7COM1079</a:t>
             </a:r>
-          </a:p>
-        </p:txBody>
-      </p:sp>
-      <p:sp>
-        <p:nvSpPr>
-          <p:cNvPr id="6" name="Slide Number Placeholder 5">
-            <a:extLst>
-              <a:ext uri="{FF2B5EF4-FFF2-40B4-BE49-F238E27FC236}">
-                <a16:creationId xmlns:a16="http://schemas.microsoft.com/office/drawing/2014/main" id="{1FA5A201-D256-A28A-086D-3A30E7F64D6E}"/>
-              </a:ext>
-            </a:extLst>
-          </p:cNvPr>
+            <a:endParaRPr lang="en-GB"/>
+          </a:p>
+        </p:txBody>
+      </p:sp>
+      <p:sp>
+        <p:nvSpPr>
+          <p:cNvPr id="6" name="Slide Number Placeholder 5"/>
           <p:cNvSpPr>
             <a:spLocks noGrp="1"/>
           </p:cNvSpPr>
@@ -1962,25 +1766,19 @@
           <a:p>
             <a:fld id="{02CD70DB-B21E-44B2-9A09-6D53D13DA6DB}" type="slidenum">
               <a:rPr lang="en-GB" smtClean="0"/>
-              <a:t>‹#›</a:t>
             </a:fld>
             <a:endParaRPr lang="en-GB"/>
           </a:p>
         </p:txBody>
       </p:sp>
     </p:spTree>
-    <p:extLst>
-      <p:ext uri="{BB962C8B-B14F-4D97-AF65-F5344CB8AC3E}">
-        <p14:creationId xmlns:p14="http://schemas.microsoft.com/office/powerpoint/2010/main" val="2506675660"/>
-      </p:ext>
-    </p:extLst>
   </p:cSld>
   <p:clrMap bg1="lt1" tx1="dk1" bg2="lt2" tx2="dk2" accent1="accent1" accent2="accent2" accent3="accent3" accent4="accent4" accent5="accent5" accent6="accent6" hlink="hlink" folHlink="folHlink"/>
   <p:sldLayoutIdLst>
-    <p:sldLayoutId id="2147483650" r:id="rId1"/>
-    <p:sldLayoutId id="2147483651" r:id="rId2"/>
-    <p:sldLayoutId id="2147483713" r:id="rId3"/>
-    <p:sldLayoutId id="2147483714" r:id="rId4"/>
+    <p:sldLayoutId id="2147483649" r:id="rId1"/>
+    <p:sldLayoutId id="2147483650" r:id="rId2"/>
+    <p:sldLayoutId id="2147483651" r:id="rId3"/>
+    <p:sldLayoutId id="2147483652" r:id="rId4"/>
   </p:sldLayoutIdLst>
   <p:hf hdr="0" dt="0"/>
   <p:txStyles>
@@ -2285,13 +2083,7 @@
       </p:grpSpPr>
       <p:sp>
         <p:nvSpPr>
-          <p:cNvPr id="2" name="Title 1">
-            <a:extLst>
-              <a:ext uri="{FF2B5EF4-FFF2-40B4-BE49-F238E27FC236}">
-                <a16:creationId xmlns:a16="http://schemas.microsoft.com/office/drawing/2014/main" id="{3440AEE4-CC66-FE42-B0C3-2CC7AFD37D1C}"/>
-              </a:ext>
-            </a:extLst>
-          </p:cNvPr>
+          <p:cNvPr id="2" name="Title 1"/>
           <p:cNvSpPr>
             <a:spLocks noGrp="1"/>
           </p:cNvSpPr>
@@ -2301,8 +2093,8 @@
         </p:nvSpPr>
         <p:spPr>
           <a:xfrm>
-            <a:off x="368886" y="2588804"/>
-            <a:ext cx="11648371" cy="2477729"/>
+            <a:off x="368935" y="3002915"/>
+            <a:ext cx="11648440" cy="2063750"/>
           </a:xfrm>
         </p:spPr>
         <p:txBody>
@@ -2311,6 +2103,11 @@
           </a:bodyPr>
           <a:lstStyle/>
           <a:p>
+            <a:pPr>
+              <a:lnSpc>
+                <a:spcPct val="100000"/>
+              </a:lnSpc>
+            </a:pPr>
             <a:r>
               <a:rPr lang="en-US" sz="4000" dirty="0">
                 <a:latin typeface="Times New Roman" panose="02020603050405020304" pitchFamily="18" charset="0"/>
@@ -2323,7 +2120,7 @@
                 <a:latin typeface="Times New Roman" panose="02020603050405020304" pitchFamily="18" charset="0"/>
                 <a:cs typeface="Times New Roman" panose="02020603050405020304" pitchFamily="18" charset="0"/>
               </a:rPr>
-              <a:t>How  the  factors (Manufacturing year of the car, Engine Size, Mileage)  significantly influence  the  resale  price  of  the  used  Skoda  cars ?</a:t>
+              <a:t>Are the proportions of fuel type (Petrol vs. Diesel) among Manual cars same as those among Automatic cars?</a:t>
             </a:r>
             <a:br>
               <a:rPr lang="en-US" sz="2700" dirty="0">
@@ -2336,14 +2133,67 @@
                 <a:latin typeface="Times New Roman" panose="02020603050405020304" pitchFamily="18" charset="0"/>
                 <a:cs typeface="Times New Roman" panose="02020603050405020304" pitchFamily="18" charset="0"/>
               </a:rPr>
-              <a:t>          </a:t>
+              <a:t>         </a:t>
+            </a:r>
+            <a:br>
+              <a:rPr lang="en-US" sz="2700" dirty="0">
+                <a:latin typeface="Times New Roman" panose="02020603050405020304" pitchFamily="18" charset="0"/>
+                <a:cs typeface="Times New Roman" panose="02020603050405020304" pitchFamily="18" charset="0"/>
+              </a:rPr>
+            </a:br>
+            <a:br>
+              <a:rPr lang="en-US" sz="2700" dirty="0">
+                <a:latin typeface="Times New Roman" panose="02020603050405020304" pitchFamily="18" charset="0"/>
+                <a:cs typeface="Times New Roman" panose="02020603050405020304" pitchFamily="18" charset="0"/>
+              </a:rPr>
+            </a:br>
+            <a:r>
+              <a:rPr lang="en-US" sz="2700" dirty="0">
+                <a:latin typeface="Times New Roman" panose="02020603050405020304" pitchFamily="18" charset="0"/>
+                <a:cs typeface="Times New Roman" panose="02020603050405020304" pitchFamily="18" charset="0"/>
+              </a:rPr>
+              <a:t> </a:t>
+            </a:r>
+            <a:br>
+              <a:rPr lang="en-US" sz="2700" dirty="0">
+                <a:latin typeface="Times New Roman" panose="02020603050405020304" pitchFamily="18" charset="0"/>
+                <a:cs typeface="Times New Roman" panose="02020603050405020304" pitchFamily="18" charset="0"/>
+              </a:rPr>
+            </a:br>
+            <a:r>
+              <a:rPr lang="en-US" sz="2700" dirty="0">
+                <a:latin typeface="Times New Roman" panose="02020603050405020304" pitchFamily="18" charset="0"/>
+                <a:cs typeface="Times New Roman" panose="02020603050405020304" pitchFamily="18" charset="0"/>
+              </a:rPr>
+              <a:t> </a:t>
+            </a:r>
+            <a:r>
+              <a:rPr lang="en-IN" altLang="en-US" sz="2700" dirty="0">
+                <a:latin typeface="Times New Roman" panose="02020603050405020304" pitchFamily="18" charset="0"/>
+                <a:cs typeface="Times New Roman" panose="02020603050405020304" pitchFamily="18" charset="0"/>
+              </a:rPr>
+              <a:t>        </a:t>
             </a:r>
             <a:r>
               <a:rPr lang="en-US" sz="2200" dirty="0">
                 <a:latin typeface="Times New Roman" panose="02020603050405020304" pitchFamily="18" charset="0"/>
                 <a:cs typeface="Times New Roman" panose="02020603050405020304" pitchFamily="18" charset="0"/>
               </a:rPr>
-              <a:t>D a t e  :  15  / 11 /  2024</a:t>
+              <a:t>D a t e  :  </a:t>
+            </a:r>
+            <a:r>
+              <a:rPr lang="en-IN" altLang="en-US" sz="2200" dirty="0">
+                <a:latin typeface="Times New Roman" panose="02020603050405020304" pitchFamily="18" charset="0"/>
+                <a:cs typeface="Times New Roman" panose="02020603050405020304" pitchFamily="18" charset="0"/>
+              </a:rPr>
+              <a:t>24/11</a:t>
+            </a:r>
+            <a:r>
+              <a:rPr lang="en-US" sz="2200" dirty="0">
+                <a:latin typeface="Times New Roman" panose="02020603050405020304" pitchFamily="18" charset="0"/>
+                <a:cs typeface="Times New Roman" panose="02020603050405020304" pitchFamily="18" charset="0"/>
+              </a:rPr>
+              <a:t>/ 2024</a:t>
             </a:r>
             <a:endParaRPr lang="en-US" dirty="0">
               <a:latin typeface="Times New Roman" panose="02020603050405020304" pitchFamily="18" charset="0"/>
@@ -2354,13 +2204,7 @@
       </p:sp>
       <p:sp>
         <p:nvSpPr>
-          <p:cNvPr id="3" name="Subtitle 2">
-            <a:extLst>
-              <a:ext uri="{FF2B5EF4-FFF2-40B4-BE49-F238E27FC236}">
-                <a16:creationId xmlns:a16="http://schemas.microsoft.com/office/drawing/2014/main" id="{8275DA97-5166-7F4B-BC83-F50AC8BEDCD7}"/>
-              </a:ext>
-            </a:extLst>
-          </p:cNvPr>
+          <p:cNvPr id="3" name="Subtitle 2"/>
           <p:cNvSpPr>
             <a:spLocks noGrp="1"/>
           </p:cNvSpPr>
@@ -2385,18 +2229,16 @@
               </a:rPr>
               <a:t>Group Name:  Group A88                                         Name of Student Presenting: Wilfred Douglas Anthony</a:t>
             </a:r>
-          </a:p>
-        </p:txBody>
-      </p:sp>
-      <p:sp>
-        <p:nvSpPr>
-          <p:cNvPr id="4" name="Footer Placeholder 3">
-            <a:extLst>
-              <a:ext uri="{FF2B5EF4-FFF2-40B4-BE49-F238E27FC236}">
-                <a16:creationId xmlns:a16="http://schemas.microsoft.com/office/drawing/2014/main" id="{6E7F4D14-5620-EC41-A86C-6CC3CFD691B4}"/>
-              </a:ext>
-            </a:extLst>
-          </p:cNvPr>
+            <a:endParaRPr lang="en-US" sz="2000" dirty="0">
+              <a:latin typeface="Times New Roman" panose="02020603050405020304" pitchFamily="18" charset="0"/>
+              <a:cs typeface="Times New Roman" panose="02020603050405020304" pitchFamily="18" charset="0"/>
+            </a:endParaRPr>
+          </a:p>
+        </p:txBody>
+      </p:sp>
+      <p:sp>
+        <p:nvSpPr>
+          <p:cNvPr id="4" name="Footer Placeholder 3"/>
           <p:cNvSpPr>
             <a:spLocks noGrp="1"/>
           </p:cNvSpPr>
@@ -2422,28 +2264,20 @@
               </a:rPr>
               <a:t>7COM1079-2024  Student Group No:  A88</a:t>
             </a:r>
+            <a:endParaRPr lang="en-GB" dirty="0">
+              <a:latin typeface="Times New Roman" panose="02020603050405020304" pitchFamily="18" charset="0"/>
+              <a:cs typeface="Times New Roman" panose="02020603050405020304" pitchFamily="18" charset="0"/>
+            </a:endParaRPr>
           </a:p>
         </p:txBody>
       </p:sp>
       <p:graphicFrame>
         <p:nvGraphicFramePr>
-          <p:cNvPr id="6" name="Table 5">
-            <a:extLst>
-              <a:ext uri="{FF2B5EF4-FFF2-40B4-BE49-F238E27FC236}">
-                <a16:creationId xmlns:a16="http://schemas.microsoft.com/office/drawing/2014/main" id="{3EEC508B-6D5F-70BB-E491-EBE0F132D2F3}"/>
-              </a:ext>
-            </a:extLst>
-          </p:cNvPr>
+          <p:cNvPr id="6" name="Table 5"/>
           <p:cNvGraphicFramePr>
             <a:graphicFrameLocks noGrp="1"/>
           </p:cNvGraphicFramePr>
-          <p:nvPr>
-            <p:extLst>
-              <p:ext uri="{D42A27DB-BD31-4B8C-83A1-F6EECF244321}">
-                <p14:modId xmlns:p14="http://schemas.microsoft.com/office/powerpoint/2010/main" val="2201241712"/>
-              </p:ext>
-            </p:extLst>
-          </p:nvPr>
+          <p:nvPr/>
         </p:nvGraphicFramePr>
         <p:xfrm>
           <a:off x="1080422" y="1312893"/>
@@ -2456,13 +2290,7 @@
                 <a:tableStyleId>{5C22544A-7EE6-4342-B048-85BDC9FD1C3A}</a:tableStyleId>
               </a:tblPr>
               <a:tblGrid>
-                <a:gridCol w="2911475">
-                  <a:extLst>
-                    <a:ext uri="{9D8B030D-6E8A-4147-A177-3AD203B41FA5}">
-                      <a16:colId xmlns:a16="http://schemas.microsoft.com/office/drawing/2014/main" val="2662927632"/>
-                    </a:ext>
-                  </a:extLst>
-                </a:gridCol>
+                <a:gridCol w="2911475"/>
               </a:tblGrid>
               <a:tr h="256151">
                 <a:tc>
@@ -2486,15 +2314,15 @@
                         </a:rPr>
                         <a:t>Krupa Rani Viyyapu</a:t>
                       </a:r>
+                      <a:endParaRPr lang="en-IN" sz="1200" kern="100">
+                        <a:effectLst/>
+                        <a:latin typeface="Times New Roman" panose="02020603050405020304" pitchFamily="18" charset="0"/>
+                        <a:cs typeface="Times New Roman" panose="02020603050405020304" pitchFamily="18" charset="0"/>
+                      </a:endParaRPr>
                     </a:p>
                   </a:txBody>
                   <a:tcPr marL="68580" marR="68580"/>
                 </a:tc>
-                <a:extLst>
-                  <a:ext uri="{0D108BD9-81ED-4DB2-BD59-A6C34878D82A}">
-                    <a16:rowId xmlns:a16="http://schemas.microsoft.com/office/drawing/2014/main" val="3127116460"/>
-                  </a:ext>
-                </a:extLst>
               </a:tr>
               <a:tr h="256151">
                 <a:tc>
@@ -2518,15 +2346,15 @@
                         </a:rPr>
                         <a:t>Wilfred Douglas Anthony</a:t>
                       </a:r>
+                      <a:endParaRPr lang="en-IN" sz="1200" kern="100" dirty="0">
+                        <a:effectLst/>
+                        <a:latin typeface="Times New Roman" panose="02020603050405020304" pitchFamily="18" charset="0"/>
+                        <a:cs typeface="Times New Roman" panose="02020603050405020304" pitchFamily="18" charset="0"/>
+                      </a:endParaRPr>
                     </a:p>
                   </a:txBody>
                   <a:tcPr marL="68580" marR="68580"/>
                 </a:tc>
-                <a:extLst>
-                  <a:ext uri="{0D108BD9-81ED-4DB2-BD59-A6C34878D82A}">
-                    <a16:rowId xmlns:a16="http://schemas.microsoft.com/office/drawing/2014/main" val="2569558601"/>
-                  </a:ext>
-                </a:extLst>
               </a:tr>
               <a:tr h="256151">
                 <a:tc>
@@ -2550,15 +2378,15 @@
                         </a:rPr>
                         <a:t>Muhammad Ajmal Tariq Khan</a:t>
                       </a:r>
+                      <a:endParaRPr lang="en-IN" sz="1200" kern="100" dirty="0">
+                        <a:effectLst/>
+                        <a:latin typeface="Times New Roman" panose="02020603050405020304" pitchFamily="18" charset="0"/>
+                        <a:cs typeface="Times New Roman" panose="02020603050405020304" pitchFamily="18" charset="0"/>
+                      </a:endParaRPr>
                     </a:p>
                   </a:txBody>
                   <a:tcPr marL="68580" marR="68580"/>
                 </a:tc>
-                <a:extLst>
-                  <a:ext uri="{0D108BD9-81ED-4DB2-BD59-A6C34878D82A}">
-                    <a16:rowId xmlns:a16="http://schemas.microsoft.com/office/drawing/2014/main" val="856557053"/>
-                  </a:ext>
-                </a:extLst>
               </a:tr>
               <a:tr h="256151">
                 <a:tc>
@@ -2582,15 +2410,15 @@
                         </a:rPr>
                         <a:t>Jostin Hemanth Keesaram Paramjothiah</a:t>
                       </a:r>
+                      <a:endParaRPr lang="en-IN" sz="1200" kern="100" dirty="0">
+                        <a:effectLst/>
+                        <a:latin typeface="Times New Roman" panose="02020603050405020304" pitchFamily="18" charset="0"/>
+                        <a:cs typeface="Times New Roman" panose="02020603050405020304" pitchFamily="18" charset="0"/>
+                      </a:endParaRPr>
                     </a:p>
                   </a:txBody>
                   <a:tcPr marL="68580" marR="68580"/>
                 </a:tc>
-                <a:extLst>
-                  <a:ext uri="{0D108BD9-81ED-4DB2-BD59-A6C34878D82A}">
-                    <a16:rowId xmlns:a16="http://schemas.microsoft.com/office/drawing/2014/main" val="4035905831"/>
-                  </a:ext>
-                </a:extLst>
               </a:tr>
               <a:tr h="0">
                 <a:tc>
@@ -2614,26 +2442,21 @@
                         </a:rPr>
                         <a:t>Prabhu Vinodhini Satyaveti</a:t>
                       </a:r>
+                      <a:endParaRPr lang="en-IN" sz="1200" kern="100" dirty="0">
+                        <a:effectLst/>
+                        <a:latin typeface="Times New Roman" panose="02020603050405020304" pitchFamily="18" charset="0"/>
+                        <a:cs typeface="Times New Roman" panose="02020603050405020304" pitchFamily="18" charset="0"/>
+                      </a:endParaRPr>
                     </a:p>
                   </a:txBody>
                   <a:tcPr marL="68580" marR="68580"/>
                 </a:tc>
-                <a:extLst>
-                  <a:ext uri="{0D108BD9-81ED-4DB2-BD59-A6C34878D82A}">
-                    <a16:rowId xmlns:a16="http://schemas.microsoft.com/office/drawing/2014/main" val="3105580442"/>
-                  </a:ext>
-                </a:extLst>
               </a:tr>
             </a:tbl>
           </a:graphicData>
         </a:graphic>
       </p:graphicFrame>
     </p:spTree>
-    <p:extLst>
-      <p:ext uri="{BB962C8B-B14F-4D97-AF65-F5344CB8AC3E}">
-        <p14:creationId xmlns:p14="http://schemas.microsoft.com/office/powerpoint/2010/main" val="4148532546"/>
-      </p:ext>
-    </p:extLst>
   </p:cSld>
   <p:clrMapOvr>
     <a:masterClrMapping/>
@@ -2660,13 +2483,7 @@
       </p:grpSpPr>
       <p:sp>
         <p:nvSpPr>
-          <p:cNvPr id="2" name="Subtitle 1">
-            <a:extLst>
-              <a:ext uri="{FF2B5EF4-FFF2-40B4-BE49-F238E27FC236}">
-                <a16:creationId xmlns:a16="http://schemas.microsoft.com/office/drawing/2014/main" id="{7D9D8228-727F-1E46-B5AD-91D158B8255E}"/>
-              </a:ext>
-            </a:extLst>
-          </p:cNvPr>
+          <p:cNvPr id="2" name="Subtitle 1"/>
           <p:cNvSpPr>
             <a:spLocks noGrp="1"/>
           </p:cNvSpPr>
@@ -2723,18 +2540,19 @@
               </a:rPr>
               <a:t> DS137</a:t>
             </a:r>
-          </a:p>
-        </p:txBody>
-      </p:sp>
-      <p:sp>
-        <p:nvSpPr>
-          <p:cNvPr id="4" name="Slide Number Placeholder 3">
-            <a:extLst>
-              <a:ext uri="{FF2B5EF4-FFF2-40B4-BE49-F238E27FC236}">
-                <a16:creationId xmlns:a16="http://schemas.microsoft.com/office/drawing/2014/main" id="{CC9D9611-42EE-7840-81EE-DD6B1A99CD7B}"/>
-              </a:ext>
-            </a:extLst>
-          </p:cNvPr>
+            <a:endParaRPr lang="en-US" sz="2400" dirty="0">
+              <a:solidFill>
+                <a:srgbClr val="FF0000"/>
+              </a:solidFill>
+              <a:latin typeface="Times New Roman" panose="02020603050405020304" pitchFamily="18" charset="0"/>
+              <a:cs typeface="Times New Roman" panose="02020603050405020304" pitchFamily="18" charset="0"/>
+            </a:endParaRPr>
+          </a:p>
+        </p:txBody>
+      </p:sp>
+      <p:sp>
+        <p:nvSpPr>
+          <p:cNvPr id="4" name="Slide Number Placeholder 3"/>
           <p:cNvSpPr>
             <a:spLocks noGrp="1"/>
           </p:cNvSpPr>
@@ -2762,13 +2580,7 @@
       </p:sp>
       <p:sp>
         <p:nvSpPr>
-          <p:cNvPr id="5" name="Title 4">
-            <a:extLst>
-              <a:ext uri="{FF2B5EF4-FFF2-40B4-BE49-F238E27FC236}">
-                <a16:creationId xmlns:a16="http://schemas.microsoft.com/office/drawing/2014/main" id="{B3FA3829-F12C-214D-8FBA-7E1A740F65CA}"/>
-              </a:ext>
-            </a:extLst>
-          </p:cNvPr>
+          <p:cNvPr id="5" name="Title 4"/>
           <p:cNvSpPr>
             <a:spLocks noGrp="1"/>
           </p:cNvSpPr>
@@ -2856,7 +2668,7 @@
                 <a:latin typeface="Times New Roman" panose="02020603050405020304" pitchFamily="18" charset="0"/>
                 <a:cs typeface="Times New Roman" panose="02020603050405020304" pitchFamily="18" charset="0"/>
               </a:rPr>
-              <a:t>Manufacturing year of the car, Engine Size, Mileage</a:t>
+              <a:t>Transmission Type (Manual vs Automatic)</a:t>
             </a:r>
             <a:br>
               <a:rPr lang="en-US" sz="2400" b="0" dirty="0">
@@ -2889,7 +2701,30 @@
                 <a:latin typeface="Times New Roman" panose="02020603050405020304" pitchFamily="18" charset="0"/>
                 <a:cs typeface="Times New Roman" panose="02020603050405020304" pitchFamily="18" charset="0"/>
               </a:rPr>
-              <a:t>Interval/measurement data.</a:t>
+              <a:t>Nominal</a:t>
+            </a:r>
+            <a:br>
+              <a:rPr lang="en-US" sz="2400" b="0" dirty="0">
+                <a:latin typeface="Times New Roman" panose="02020603050405020304" pitchFamily="18" charset="0"/>
+                <a:cs typeface="Times New Roman" panose="02020603050405020304" pitchFamily="18" charset="0"/>
+              </a:rPr>
+            </a:br>
+            <a:r>
+              <a:rPr lang="en-US" sz="2400" b="0" dirty="0">
+                <a:latin typeface="Times New Roman" panose="02020603050405020304" pitchFamily="18" charset="0"/>
+                <a:cs typeface="Times New Roman" panose="02020603050405020304" pitchFamily="18" charset="0"/>
+              </a:rPr>
+              <a:t>Our Dependent variable is   </a:t>
+            </a:r>
+            <a:r>
+              <a:rPr lang="en-US" sz="2400" b="0" dirty="0">
+                <a:solidFill>
+                  <a:srgbClr val="FF0000"/>
+                </a:solidFill>
+                <a:latin typeface="Times New Roman" panose="02020603050405020304" pitchFamily="18" charset="0"/>
+                <a:cs typeface="Times New Roman" panose="02020603050405020304" pitchFamily="18" charset="0"/>
+              </a:rPr>
+              <a:t>Fuel Type (Petrol Vs Diesel)</a:t>
             </a:r>
             <a:br>
               <a:rPr lang="en-US" sz="2400" b="0" dirty="0">
@@ -2900,18 +2735,12 @@
                 <a:cs typeface="Times New Roman" panose="02020603050405020304" pitchFamily="18" charset="0"/>
               </a:rPr>
             </a:br>
-            <a:br>
+            <a:r>
               <a:rPr lang="en-US" sz="2400" b="0" dirty="0">
                 <a:latin typeface="Times New Roman" panose="02020603050405020304" pitchFamily="18" charset="0"/>
                 <a:cs typeface="Times New Roman" panose="02020603050405020304" pitchFamily="18" charset="0"/>
               </a:rPr>
-            </a:br>
-            <a:r>
-              <a:rPr lang="en-US" sz="2400" b="0" dirty="0">
-                <a:latin typeface="Times New Roman" panose="02020603050405020304" pitchFamily="18" charset="0"/>
-                <a:cs typeface="Times New Roman" panose="02020603050405020304" pitchFamily="18" charset="0"/>
-              </a:rPr>
-              <a:t>Our Dependent variable is   </a:t>
+              <a:t>This Dependent variable datatype is  (select one): </a:t>
             </a:r>
             <a:r>
               <a:rPr lang="en-US" sz="2400" b="0" dirty="0">
@@ -2921,53 +2750,19 @@
                 <a:latin typeface="Times New Roman" panose="02020603050405020304" pitchFamily="18" charset="0"/>
                 <a:cs typeface="Times New Roman" panose="02020603050405020304" pitchFamily="18" charset="0"/>
               </a:rPr>
-              <a:t>Price (Resale Price of the Skoda Car)</a:t>
-            </a:r>
-            <a:br>
-              <a:rPr lang="en-US" sz="2400" b="0" dirty="0">
-                <a:solidFill>
-                  <a:srgbClr val="FF0000"/>
-                </a:solidFill>
-                <a:latin typeface="Times New Roman" panose="02020603050405020304" pitchFamily="18" charset="0"/>
-                <a:cs typeface="Times New Roman" panose="02020603050405020304" pitchFamily="18" charset="0"/>
-              </a:rPr>
-            </a:br>
-            <a:r>
-              <a:rPr lang="en-US" sz="2400" b="0" dirty="0">
-                <a:solidFill>
-                  <a:srgbClr val="FF0000"/>
-                </a:solidFill>
-                <a:latin typeface="Times New Roman" panose="02020603050405020304" pitchFamily="18" charset="0"/>
-                <a:cs typeface="Times New Roman" panose="02020603050405020304" pitchFamily="18" charset="0"/>
-              </a:rPr>
-              <a:t>                   </a:t>
-            </a:r>
-            <a:r>
-              <a:rPr lang="en-US" sz="2400" b="0" dirty="0">
-                <a:latin typeface="Times New Roman" panose="02020603050405020304" pitchFamily="18" charset="0"/>
-                <a:cs typeface="Times New Roman" panose="02020603050405020304" pitchFamily="18" charset="0"/>
-              </a:rPr>
-              <a:t>This Dependent variable datatype is  (select one): </a:t>
-            </a:r>
-            <a:r>
-              <a:rPr lang="en-US" sz="2400" b="0" dirty="0">
-                <a:solidFill>
-                  <a:srgbClr val="FF0000"/>
-                </a:solidFill>
-                <a:latin typeface="Times New Roman" panose="02020603050405020304" pitchFamily="18" charset="0"/>
-                <a:cs typeface="Times New Roman" panose="02020603050405020304" pitchFamily="18" charset="0"/>
-              </a:rPr>
-              <a:t>Interval/measurement data</a:t>
-            </a:r>
+              <a:t>Nominal</a:t>
+            </a:r>
+            <a:endParaRPr lang="en-US" sz="2400" b="0" dirty="0">
+              <a:solidFill>
+                <a:srgbClr val="FF0000"/>
+              </a:solidFill>
+              <a:latin typeface="Times New Roman" panose="02020603050405020304" pitchFamily="18" charset="0"/>
+              <a:cs typeface="Times New Roman" panose="02020603050405020304" pitchFamily="18" charset="0"/>
+            </a:endParaRPr>
           </a:p>
         </p:txBody>
       </p:sp>
     </p:spTree>
-    <p:extLst>
-      <p:ext uri="{BB962C8B-B14F-4D97-AF65-F5344CB8AC3E}">
-        <p14:creationId xmlns:p14="http://schemas.microsoft.com/office/powerpoint/2010/main" val="1718004908"/>
-      </p:ext>
-    </p:extLst>
   </p:cSld>
   <p:clrMapOvr>
     <a:masterClrMapping/>
@@ -2994,13 +2789,7 @@
       </p:grpSpPr>
       <p:sp>
         <p:nvSpPr>
-          <p:cNvPr id="2" name="Subtitle 1">
-            <a:extLst>
-              <a:ext uri="{FF2B5EF4-FFF2-40B4-BE49-F238E27FC236}">
-                <a16:creationId xmlns:a16="http://schemas.microsoft.com/office/drawing/2014/main" id="{8E3CD731-5ACF-B002-247D-243F6E2149EC}"/>
-              </a:ext>
-            </a:extLst>
-          </p:cNvPr>
+          <p:cNvPr id="2" name="Subtitle 1"/>
           <p:cNvSpPr>
             <a:spLocks noGrp="1"/>
           </p:cNvSpPr>
@@ -3037,13 +2826,7 @@
       </p:sp>
       <p:sp>
         <p:nvSpPr>
-          <p:cNvPr id="4" name="Slide Number Placeholder 3">
-            <a:extLst>
-              <a:ext uri="{FF2B5EF4-FFF2-40B4-BE49-F238E27FC236}">
-                <a16:creationId xmlns:a16="http://schemas.microsoft.com/office/drawing/2014/main" id="{1625FA15-B17F-387B-E383-5505647ABB89}"/>
-              </a:ext>
-            </a:extLst>
-          </p:cNvPr>
+          <p:cNvPr id="4" name="Slide Number Placeholder 3"/>
           <p:cNvSpPr>
             <a:spLocks noGrp="1"/>
           </p:cNvSpPr>
@@ -3071,13 +2854,7 @@
       </p:sp>
       <p:sp>
         <p:nvSpPr>
-          <p:cNvPr id="5" name="Title 4">
-            <a:extLst>
-              <a:ext uri="{FF2B5EF4-FFF2-40B4-BE49-F238E27FC236}">
-                <a16:creationId xmlns:a16="http://schemas.microsoft.com/office/drawing/2014/main" id="{3440DA25-F620-152B-DE9E-776F7B74DFF0}"/>
-              </a:ext>
-            </a:extLst>
-          </p:cNvPr>
+          <p:cNvPr id="5" name="Title 4"/>
           <p:cNvSpPr>
             <a:spLocks noGrp="1"/>
           </p:cNvSpPr>
@@ -3103,13 +2880,22 @@
               </a:lnSpc>
             </a:pPr>
             <a:r>
+              <a:rPr lang="en-IN" altLang="en-IE" sz="2400" b="0" dirty="0">
+                <a:effectLst/>
+                <a:latin typeface="Times New Roman" panose="02020603050405020304" pitchFamily="18" charset="0"/>
+                <a:ea typeface="Calibri" panose="020F0502020204030204" pitchFamily="34" charset="0"/>
+                <a:cs typeface="Times New Roman" panose="02020603050405020304" pitchFamily="18" charset="0"/>
+              </a:rPr>
+              <a:t>Nominal Vs Nominal</a:t>
+            </a:r>
+            <a:r>
               <a:rPr lang="en-IE" sz="2400" b="0" dirty="0">
                 <a:effectLst/>
                 <a:latin typeface="Times New Roman" panose="02020603050405020304" pitchFamily="18" charset="0"/>
                 <a:ea typeface="Calibri" panose="020F0502020204030204" pitchFamily="34" charset="0"/>
                 <a:cs typeface="Times New Roman" panose="02020603050405020304" pitchFamily="18" charset="0"/>
               </a:rPr>
-              <a:t>Interval/Ordinal vs Interval/Ordinal: </a:t>
+              <a:t>: </a:t>
             </a:r>
             <a:r>
               <a:rPr lang="en-IE" sz="2400" b="0" dirty="0">
@@ -3121,17 +2907,19 @@
                 <a:ea typeface="Calibri" panose="020F0502020204030204" pitchFamily="34" charset="0"/>
                 <a:cs typeface="Times New Roman" panose="02020603050405020304" pitchFamily="18" charset="0"/>
               </a:rPr>
-              <a:t>“Is there a correlation between [</a:t>
+              <a:t>“</a:t>
             </a:r>
             <a:r>
               <a:rPr lang="en-US" sz="2400" b="0" dirty="0">
                 <a:solidFill>
                   <a:srgbClr val="FF0000"/>
                 </a:solidFill>
-                <a:latin typeface="Times New Roman" panose="02020603050405020304" pitchFamily="18" charset="0"/>
-                <a:cs typeface="Times New Roman" panose="02020603050405020304" pitchFamily="18" charset="0"/>
-              </a:rPr>
-              <a:t>Price (Resale Price of the Skoda Car) </a:t>
+                <a:effectLst/>
+                <a:latin typeface="Times New Roman" panose="02020603050405020304" pitchFamily="18" charset="0"/>
+                <a:ea typeface="Calibri" panose="020F0502020204030204" pitchFamily="34" charset="0"/>
+                <a:cs typeface="Times New Roman" panose="02020603050405020304" pitchFamily="18" charset="0"/>
+              </a:rPr>
+              <a:t>Are the proportions of fuel type (Petrol vs. Diesel) among Manual cars same as those among Automatic cars?</a:t>
             </a:r>
             <a:r>
               <a:rPr lang="en-IE" sz="2400" b="0" dirty="0">
@@ -3143,41 +2931,7 @@
                 <a:ea typeface="Calibri" panose="020F0502020204030204" pitchFamily="34" charset="0"/>
                 <a:cs typeface="Times New Roman" panose="02020603050405020304" pitchFamily="18" charset="0"/>
               </a:rPr>
-              <a:t>and</a:t>
-            </a:r>
-            <a:r>
-              <a:rPr lang="en-IE" sz="2400" b="0" dirty="0">
-                <a:solidFill>
-                  <a:srgbClr val="FF0000"/>
-                </a:solidFill>
-                <a:latin typeface="Times New Roman" panose="02020603050405020304" pitchFamily="18" charset="0"/>
-                <a:ea typeface="Calibri" panose="020F0502020204030204" pitchFamily="34" charset="0"/>
-                <a:cs typeface="Times New Roman" panose="02020603050405020304" pitchFamily="18" charset="0"/>
-              </a:rPr>
-              <a:t>  </a:t>
-            </a:r>
-            <a:r>
-              <a:rPr lang="en-US" sz="2400" b="0" dirty="0">
-                <a:solidFill>
-                  <a:srgbClr val="FF0000"/>
-                </a:solidFill>
-                <a:latin typeface="Times New Roman" panose="02020603050405020304" pitchFamily="18" charset="0"/>
-                <a:ea typeface="Calibri" panose="020F0502020204030204" pitchFamily="34" charset="0"/>
-                <a:cs typeface="Times New Roman" panose="02020603050405020304" pitchFamily="18" charset="0"/>
-              </a:rPr>
-              <a:t>Manufacturing year of the car, Engine Size, Mileage</a:t>
-            </a:r>
-            <a:r>
-              <a:rPr lang="en-IE" sz="2400" b="0" dirty="0">
-                <a:solidFill>
-                  <a:srgbClr val="FF0000"/>
-                </a:solidFill>
-                <a:effectLst/>
-                <a:latin typeface="Times New Roman" panose="02020603050405020304" pitchFamily="18" charset="0"/>
-                <a:ea typeface="Calibri" panose="020F0502020204030204" pitchFamily="34" charset="0"/>
-                <a:cs typeface="Times New Roman" panose="02020603050405020304" pitchFamily="18" charset="0"/>
-              </a:rPr>
-              <a:t>]”. </a:t>
+              <a:t>”. </a:t>
             </a:r>
             <a:br>
               <a:rPr lang="en-IE" sz="2400" dirty="0">
@@ -3210,7 +2964,7 @@
                 <a:latin typeface="Times New Roman" panose="02020603050405020304" pitchFamily="18" charset="0"/>
                 <a:cs typeface="Times New Roman" panose="02020603050405020304" pitchFamily="18" charset="0"/>
               </a:rPr>
-              <a:t>There is no relationship between the independent variables (Manufacturing year of the car, Engine Size, Mileage) and the Resale Price.</a:t>
+              <a:t>The proportions of Petrol vs. Diesel cars are the same for both Manual and Automatic transmission types.</a:t>
             </a:r>
             <a:br>
               <a:rPr lang="en-US" sz="2400" b="0" spc="0" dirty="0">
@@ -3242,16 +2996,8 @@
                 <a:latin typeface="Times New Roman" panose="02020603050405020304" pitchFamily="18" charset="0"/>
                 <a:cs typeface="Times New Roman" panose="02020603050405020304" pitchFamily="18" charset="0"/>
               </a:rPr>
-              <a:t>There is relationship between the independent variables (Manufacturing year of the car, Engine Size, Mileage) and the Resale Price.</a:t>
-            </a:r>
-            <a:br>
-              <a:rPr lang="en-GB" sz="2400" b="0" dirty="0">
-                <a:effectLst/>
-                <a:latin typeface="Times New Roman" panose="02020603050405020304" pitchFamily="18" charset="0"/>
-                <a:ea typeface="Calibri" panose="020F0502020204030204" pitchFamily="34" charset="0"/>
-                <a:cs typeface="Times New Roman" panose="02020603050405020304" pitchFamily="18" charset="0"/>
-              </a:rPr>
-            </a:br>
+              <a:t>The proportions of Petrol vs. Diesel cars differ between Manual and Automatic transmission types.</a:t>
+            </a:r>
             <a:br>
               <a:rPr lang="en-IE" sz="2400" dirty="0">
                 <a:solidFill>
@@ -3282,11 +3028,6 @@
         </p:txBody>
       </p:sp>
     </p:spTree>
-    <p:extLst>
-      <p:ext uri="{BB962C8B-B14F-4D97-AF65-F5344CB8AC3E}">
-        <p14:creationId xmlns:p14="http://schemas.microsoft.com/office/powerpoint/2010/main" val="32494612"/>
-      </p:ext>
-    </p:extLst>
   </p:cSld>
   <p:clrMapOvr>
     <a:masterClrMapping/>
@@ -3313,50 +3054,14 @@
       </p:grpSpPr>
       <p:sp>
         <p:nvSpPr>
-          <p:cNvPr id="4" name="Slide Number Placeholder 3">
-            <a:extLst>
-              <a:ext uri="{FF2B5EF4-FFF2-40B4-BE49-F238E27FC236}">
-                <a16:creationId xmlns:a16="http://schemas.microsoft.com/office/drawing/2014/main" id="{3B3ECC44-5D60-94AC-4870-50AB0E114C12}"/>
-              </a:ext>
-            </a:extLst>
-          </p:cNvPr>
-          <p:cNvSpPr>
-            <a:spLocks noGrp="1"/>
-          </p:cNvSpPr>
-          <p:nvPr>
-            <p:ph type="sldNum" sz="quarter" idx="12"/>
-          </p:nvPr>
-        </p:nvSpPr>
-        <p:spPr/>
-        <p:txBody>
-          <a:bodyPr/>
-          <a:lstStyle/>
-          <a:p>
-            <a:fld id="{E4D355CA-84B7-41B1-B164-8BB439CC7C6B}" type="slidenum">
-              <a:rPr lang="en-GB" smtClean="0"/>
-              <a:pPr/>
-              <a:t>4</a:t>
-            </a:fld>
-            <a:endParaRPr lang="en-GB" dirty="0"/>
-          </a:p>
-        </p:txBody>
-      </p:sp>
-      <p:sp>
-        <p:nvSpPr>
-          <p:cNvPr id="17" name="TextBox 16">
-            <a:extLst>
-              <a:ext uri="{FF2B5EF4-FFF2-40B4-BE49-F238E27FC236}">
-                <a16:creationId xmlns:a16="http://schemas.microsoft.com/office/drawing/2014/main" id="{8B8A1D46-CD70-CA1B-6D65-F01DCB427158}"/>
-              </a:ext>
-            </a:extLst>
-          </p:cNvPr>
+          <p:cNvPr id="2" name="TextBox 1"/>
           <p:cNvSpPr txBox="1"/>
           <p:nvPr/>
         </p:nvSpPr>
         <p:spPr>
           <a:xfrm>
-            <a:off x="619431" y="1649442"/>
-            <a:ext cx="11159613" cy="3559116"/>
+            <a:off x="496528" y="414254"/>
+            <a:ext cx="11198943" cy="2258567"/>
           </a:xfrm>
           <a:prstGeom prst="rect">
             <a:avLst/>
@@ -3364,12 +3069,25 @@
           <a:noFill/>
         </p:spPr>
         <p:txBody>
-          <a:bodyPr wrap="square">
+          <a:bodyPr wrap="square" rtlCol="0">
             <a:spAutoFit/>
           </a:bodyPr>
           <a:lstStyle/>
           <a:p>
-            <a:pPr>
+            <a:r>
+              <a:rPr lang="en-US" sz="1800" b="1" dirty="0">
+                <a:latin typeface="Times New Roman" panose="02020603050405020304" pitchFamily="18" charset="0"/>
+                <a:cs typeface="Times New Roman" panose="02020603050405020304" pitchFamily="18" charset="0"/>
+              </a:rPr>
+              <a:t>COMPARISON OF PROPORTION ANALYSIS:</a:t>
+            </a:r>
+            <a:endParaRPr lang="en-US" sz="1800" b="1" dirty="0">
+              <a:latin typeface="Times New Roman" panose="02020603050405020304" pitchFamily="18" charset="0"/>
+              <a:cs typeface="Times New Roman" panose="02020603050405020304" pitchFamily="18" charset="0"/>
+            </a:endParaRPr>
+          </a:p>
+          <a:p>
+            <a:pPr algn="just">
               <a:lnSpc>
                 <a:spcPct val="115000"/>
               </a:lnSpc>
@@ -3378,307 +3096,14 @@
               </a:spcAft>
             </a:pPr>
             <a:r>
-              <a:rPr lang="en-US" sz="1800" kern="100" dirty="0" err="1">
+              <a:rPr lang="en-IN" sz="1800" kern="100" dirty="0">
                 <a:effectLst/>
                 <a:latin typeface="Times New Roman" panose="02020603050405020304" pitchFamily="18" charset="0"/>
                 <a:ea typeface="Aptos" panose="020B0004020202020204" pitchFamily="34" charset="0"/>
                 <a:cs typeface="Times New Roman" panose="02020603050405020304" pitchFamily="18" charset="0"/>
               </a:rPr>
-              <a:t>skoda_data</a:t>
-            </a:r>
-            <a:r>
-              <a:rPr lang="en-US" sz="1800" kern="100" dirty="0">
-                <a:effectLst/>
-                <a:latin typeface="Times New Roman" panose="02020603050405020304" pitchFamily="18" charset="0"/>
-                <a:ea typeface="Aptos" panose="020B0004020202020204" pitchFamily="34" charset="0"/>
-                <a:cs typeface="Times New Roman" panose="02020603050405020304" pitchFamily="18" charset="0"/>
-              </a:rPr>
-              <a:t> &lt;- read.csv("skoda.csv")</a:t>
-            </a:r>
-          </a:p>
-          <a:p>
-            <a:pPr>
-              <a:lnSpc>
-                <a:spcPct val="115000"/>
-              </a:lnSpc>
-              <a:spcAft>
-                <a:spcPts val="800"/>
-              </a:spcAft>
-            </a:pPr>
-            <a:r>
-              <a:rPr lang="en-US" sz="1800" kern="100" dirty="0" err="1">
-                <a:effectLst/>
-                <a:latin typeface="Times New Roman" panose="02020603050405020304" pitchFamily="18" charset="0"/>
-                <a:ea typeface="Aptos" panose="020B0004020202020204" pitchFamily="34" charset="0"/>
-                <a:cs typeface="Times New Roman" panose="02020603050405020304" pitchFamily="18" charset="0"/>
-              </a:rPr>
-              <a:t>skoda_data$price</a:t>
-            </a:r>
-            <a:r>
-              <a:rPr lang="en-US" sz="1800" kern="100" dirty="0">
-                <a:effectLst/>
-                <a:latin typeface="Times New Roman" panose="02020603050405020304" pitchFamily="18" charset="0"/>
-                <a:ea typeface="Aptos" panose="020B0004020202020204" pitchFamily="34" charset="0"/>
-                <a:cs typeface="Times New Roman" panose="02020603050405020304" pitchFamily="18" charset="0"/>
-              </a:rPr>
-              <a:t> &lt;- </a:t>
-            </a:r>
-          </a:p>
-          <a:p>
-            <a:pPr>
-              <a:lnSpc>
-                <a:spcPct val="115000"/>
-              </a:lnSpc>
-              <a:spcAft>
-                <a:spcPts val="800"/>
-              </a:spcAft>
-            </a:pPr>
-            <a:r>
-              <a:rPr lang="en-US" sz="1800" kern="100" dirty="0" err="1">
-                <a:effectLst/>
-                <a:latin typeface="Times New Roman" panose="02020603050405020304" pitchFamily="18" charset="0"/>
-                <a:ea typeface="Aptos" panose="020B0004020202020204" pitchFamily="34" charset="0"/>
-                <a:cs typeface="Times New Roman" panose="02020603050405020304" pitchFamily="18" charset="0"/>
-              </a:rPr>
-              <a:t>na.omit</a:t>
-            </a:r>
-            <a:r>
-              <a:rPr lang="en-US" sz="1800" kern="100" dirty="0">
-                <a:effectLst/>
-                <a:latin typeface="Times New Roman" panose="02020603050405020304" pitchFamily="18" charset="0"/>
-                <a:ea typeface="Aptos" panose="020B0004020202020204" pitchFamily="34" charset="0"/>
-                <a:cs typeface="Times New Roman" panose="02020603050405020304" pitchFamily="18" charset="0"/>
-              </a:rPr>
-              <a:t>(</a:t>
-            </a:r>
-            <a:r>
-              <a:rPr lang="en-US" sz="1800" kern="100" dirty="0" err="1">
-                <a:effectLst/>
-                <a:latin typeface="Times New Roman" panose="02020603050405020304" pitchFamily="18" charset="0"/>
-                <a:ea typeface="Aptos" panose="020B0004020202020204" pitchFamily="34" charset="0"/>
-                <a:cs typeface="Times New Roman" panose="02020603050405020304" pitchFamily="18" charset="0"/>
-              </a:rPr>
-              <a:t>skoda_data$price</a:t>
-            </a:r>
-            <a:r>
-              <a:rPr lang="en-US" sz="1800" kern="100" dirty="0">
-                <a:effectLst/>
-                <a:latin typeface="Times New Roman" panose="02020603050405020304" pitchFamily="18" charset="0"/>
-                <a:ea typeface="Aptos" panose="020B0004020202020204" pitchFamily="34" charset="0"/>
-                <a:cs typeface="Times New Roman" panose="02020603050405020304" pitchFamily="18" charset="0"/>
-              </a:rPr>
-              <a:t>)</a:t>
-            </a:r>
-          </a:p>
-          <a:p>
-            <a:pPr>
-              <a:lnSpc>
-                <a:spcPct val="115000"/>
-              </a:lnSpc>
-              <a:spcAft>
-                <a:spcPts val="800"/>
-              </a:spcAft>
-            </a:pPr>
-            <a:r>
-              <a:rPr lang="en-US" sz="1800" kern="100" dirty="0">
-                <a:effectLst/>
-                <a:latin typeface="Times New Roman" panose="02020603050405020304" pitchFamily="18" charset="0"/>
-                <a:ea typeface="Aptos" panose="020B0004020202020204" pitchFamily="34" charset="0"/>
-                <a:cs typeface="Times New Roman" panose="02020603050405020304" pitchFamily="18" charset="0"/>
-              </a:rPr>
-              <a:t>if (</a:t>
-            </a:r>
-            <a:r>
-              <a:rPr lang="en-US" sz="1800" kern="100" dirty="0" err="1">
-                <a:effectLst/>
-                <a:latin typeface="Times New Roman" panose="02020603050405020304" pitchFamily="18" charset="0"/>
-                <a:ea typeface="Aptos" panose="020B0004020202020204" pitchFamily="34" charset="0"/>
-                <a:cs typeface="Times New Roman" panose="02020603050405020304" pitchFamily="18" charset="0"/>
-              </a:rPr>
-              <a:t>is.numeric</a:t>
-            </a:r>
-            <a:r>
-              <a:rPr lang="en-US" sz="1800" kern="100" dirty="0">
-                <a:effectLst/>
-                <a:latin typeface="Times New Roman" panose="02020603050405020304" pitchFamily="18" charset="0"/>
-                <a:ea typeface="Aptos" panose="020B0004020202020204" pitchFamily="34" charset="0"/>
-                <a:cs typeface="Times New Roman" panose="02020603050405020304" pitchFamily="18" charset="0"/>
-              </a:rPr>
-              <a:t>(</a:t>
-            </a:r>
-            <a:r>
-              <a:rPr lang="en-US" sz="1800" kern="100" dirty="0" err="1">
-                <a:effectLst/>
-                <a:latin typeface="Times New Roman" panose="02020603050405020304" pitchFamily="18" charset="0"/>
-                <a:ea typeface="Aptos" panose="020B0004020202020204" pitchFamily="34" charset="0"/>
-                <a:cs typeface="Times New Roman" panose="02020603050405020304" pitchFamily="18" charset="0"/>
-              </a:rPr>
-              <a:t>skoda_data$price</a:t>
-            </a:r>
-            <a:r>
-              <a:rPr lang="en-US" sz="1800" kern="100" dirty="0">
-                <a:effectLst/>
-                <a:latin typeface="Times New Roman" panose="02020603050405020304" pitchFamily="18" charset="0"/>
-                <a:ea typeface="Aptos" panose="020B0004020202020204" pitchFamily="34" charset="0"/>
-                <a:cs typeface="Times New Roman" panose="02020603050405020304" pitchFamily="18" charset="0"/>
-              </a:rPr>
-              <a:t>) &amp;&amp; length(</a:t>
-            </a:r>
-            <a:r>
-              <a:rPr lang="en-US" sz="1800" kern="100" dirty="0" err="1">
-                <a:effectLst/>
-                <a:latin typeface="Times New Roman" panose="02020603050405020304" pitchFamily="18" charset="0"/>
-                <a:ea typeface="Aptos" panose="020B0004020202020204" pitchFamily="34" charset="0"/>
-                <a:cs typeface="Times New Roman" panose="02020603050405020304" pitchFamily="18" charset="0"/>
-              </a:rPr>
-              <a:t>skoda_data$price</a:t>
-            </a:r>
-            <a:r>
-              <a:rPr lang="en-US" sz="1800" kern="100" dirty="0">
-                <a:effectLst/>
-                <a:latin typeface="Times New Roman" panose="02020603050405020304" pitchFamily="18" charset="0"/>
-                <a:ea typeface="Aptos" panose="020B0004020202020204" pitchFamily="34" charset="0"/>
-                <a:cs typeface="Times New Roman" panose="02020603050405020304" pitchFamily="18" charset="0"/>
-              </a:rPr>
-              <a:t>) &gt; 0) {  </a:t>
-            </a:r>
-          </a:p>
-          <a:p>
-            <a:pPr>
-              <a:lnSpc>
-                <a:spcPct val="115000"/>
-              </a:lnSpc>
-              <a:spcAft>
-                <a:spcPts val="800"/>
-              </a:spcAft>
-            </a:pPr>
-            <a:r>
-              <a:rPr lang="en-US" sz="1800" kern="100" dirty="0">
-                <a:effectLst/>
-                <a:latin typeface="Times New Roman" panose="02020603050405020304" pitchFamily="18" charset="0"/>
-                <a:ea typeface="Aptos" panose="020B0004020202020204" pitchFamily="34" charset="0"/>
-                <a:cs typeface="Times New Roman" panose="02020603050405020304" pitchFamily="18" charset="0"/>
-              </a:rPr>
-              <a:t>hist(</a:t>
-            </a:r>
-            <a:r>
-              <a:rPr lang="en-US" sz="1800" kern="100" dirty="0" err="1">
-                <a:effectLst/>
-                <a:latin typeface="Times New Roman" panose="02020603050405020304" pitchFamily="18" charset="0"/>
-                <a:ea typeface="Aptos" panose="020B0004020202020204" pitchFamily="34" charset="0"/>
-                <a:cs typeface="Times New Roman" panose="02020603050405020304" pitchFamily="18" charset="0"/>
-              </a:rPr>
-              <a:t>skoda_data$price</a:t>
-            </a:r>
-            <a:r>
-              <a:rPr lang="en-US" sz="1800" kern="100" dirty="0">
-                <a:effectLst/>
-                <a:latin typeface="Times New Roman" panose="02020603050405020304" pitchFamily="18" charset="0"/>
-                <a:ea typeface="Aptos" panose="020B0004020202020204" pitchFamily="34" charset="0"/>
-                <a:cs typeface="Times New Roman" panose="02020603050405020304" pitchFamily="18" charset="0"/>
-              </a:rPr>
-              <a:t>, probability = TRUE, </a:t>
-            </a:r>
-          </a:p>
-          <a:p>
-            <a:pPr>
-              <a:lnSpc>
-                <a:spcPct val="115000"/>
-              </a:lnSpc>
-              <a:spcAft>
-                <a:spcPts val="800"/>
-              </a:spcAft>
-            </a:pPr>
-            <a:r>
-              <a:rPr lang="en-US" sz="1800" kern="100" dirty="0">
-                <a:effectLst/>
-                <a:latin typeface="Times New Roman" panose="02020603050405020304" pitchFamily="18" charset="0"/>
-                <a:ea typeface="Aptos" panose="020B0004020202020204" pitchFamily="34" charset="0"/>
-                <a:cs typeface="Times New Roman" panose="02020603050405020304" pitchFamily="18" charset="0"/>
-              </a:rPr>
-              <a:t>col = "</a:t>
-            </a:r>
-            <a:r>
-              <a:rPr lang="en-US" sz="1800" kern="100" dirty="0" err="1">
-                <a:effectLst/>
-                <a:latin typeface="Times New Roman" panose="02020603050405020304" pitchFamily="18" charset="0"/>
-                <a:ea typeface="Aptos" panose="020B0004020202020204" pitchFamily="34" charset="0"/>
-                <a:cs typeface="Times New Roman" panose="02020603050405020304" pitchFamily="18" charset="0"/>
-              </a:rPr>
-              <a:t>lightblue</a:t>
-            </a:r>
-            <a:r>
-              <a:rPr lang="en-US" sz="1800" kern="100" dirty="0">
-                <a:effectLst/>
-                <a:latin typeface="Times New Roman" panose="02020603050405020304" pitchFamily="18" charset="0"/>
-                <a:ea typeface="Aptos" panose="020B0004020202020204" pitchFamily="34" charset="0"/>
-                <a:cs typeface="Times New Roman" panose="02020603050405020304" pitchFamily="18" charset="0"/>
-              </a:rPr>
-              <a:t>",       border = "black", breaks = 30,main = </a:t>
-            </a:r>
-          </a:p>
-          <a:p>
-            <a:pPr>
-              <a:lnSpc>
-                <a:spcPct val="115000"/>
-              </a:lnSpc>
-              <a:spcAft>
-                <a:spcPts val="800"/>
-              </a:spcAft>
-            </a:pPr>
-            <a:r>
-              <a:rPr lang="en-US" sz="1800" kern="100" dirty="0">
-                <a:effectLst/>
-                <a:latin typeface="Times New Roman" panose="02020603050405020304" pitchFamily="18" charset="0"/>
-                <a:ea typeface="Aptos" panose="020B0004020202020204" pitchFamily="34" charset="0"/>
-                <a:cs typeface="Times New Roman" panose="02020603050405020304" pitchFamily="18" charset="0"/>
-              </a:rPr>
-              <a:t>"Density Curve for Histogram of Resale Price")  lines(density(</a:t>
-            </a:r>
-            <a:r>
-              <a:rPr lang="en-US" sz="1800" kern="100" dirty="0" err="1">
-                <a:effectLst/>
-                <a:latin typeface="Times New Roman" panose="02020603050405020304" pitchFamily="18" charset="0"/>
-                <a:ea typeface="Aptos" panose="020B0004020202020204" pitchFamily="34" charset="0"/>
-                <a:cs typeface="Times New Roman" panose="02020603050405020304" pitchFamily="18" charset="0"/>
-              </a:rPr>
-              <a:t>skoda_data$price</a:t>
-            </a:r>
-            <a:r>
-              <a:rPr lang="en-US" sz="1800" kern="100" dirty="0">
-                <a:effectLst/>
-                <a:latin typeface="Times New Roman" panose="02020603050405020304" pitchFamily="18" charset="0"/>
-                <a:ea typeface="Aptos" panose="020B0004020202020204" pitchFamily="34" charset="0"/>
-                <a:cs typeface="Times New Roman" panose="02020603050405020304" pitchFamily="18" charset="0"/>
-              </a:rPr>
-              <a:t>), col = "red", </a:t>
-            </a:r>
-            <a:r>
-              <a:rPr lang="en-US" sz="1800" kern="100" dirty="0" err="1">
-                <a:effectLst/>
-                <a:latin typeface="Times New Roman" panose="02020603050405020304" pitchFamily="18" charset="0"/>
-                <a:ea typeface="Aptos" panose="020B0004020202020204" pitchFamily="34" charset="0"/>
-                <a:cs typeface="Times New Roman" panose="02020603050405020304" pitchFamily="18" charset="0"/>
-              </a:rPr>
-              <a:t>lwd</a:t>
-            </a:r>
-            <a:r>
-              <a:rPr lang="en-US" sz="1800" kern="100" dirty="0">
-                <a:effectLst/>
-                <a:latin typeface="Times New Roman" panose="02020603050405020304" pitchFamily="18" charset="0"/>
-                <a:ea typeface="Aptos" panose="020B0004020202020204" pitchFamily="34" charset="0"/>
-                <a:cs typeface="Times New Roman" panose="02020603050405020304" pitchFamily="18" charset="0"/>
-              </a:rPr>
-              <a:t> = 2)} else {  cat("Error: 'price' column is not suitable for plotting.")</a:t>
-            </a:r>
-            <a:br>
-              <a:rPr lang="en-US" sz="1800" kern="100" dirty="0">
-                <a:effectLst/>
-                <a:latin typeface="Aptos" panose="020B0004020202020204" pitchFamily="34" charset="0"/>
-                <a:ea typeface="Aptos" panose="020B0004020202020204" pitchFamily="34" charset="0"/>
-                <a:cs typeface="Times New Roman" panose="02020603050405020304" pitchFamily="18" charset="0"/>
-              </a:rPr>
-            </a:br>
+              <a:t>Comparison of Proportion Analysis refers to a statistical technique used to compare the proportions of a categorical outcome between two or more groups. It is commonly used in hypothesis testing to determine whether the proportions in one group significantly differ from those in another group. </a:t>
+            </a:r>
             <a:endParaRPr lang="en-IN" sz="1800" kern="100" dirty="0">
               <a:effectLst/>
               <a:latin typeface="Aptos" panose="020B0004020202020204" pitchFamily="34" charset="0"/>
@@ -3686,49 +3111,65 @@
               <a:cs typeface="Times New Roman" panose="02020603050405020304" pitchFamily="18" charset="0"/>
             </a:endParaRPr>
           </a:p>
-        </p:txBody>
-      </p:sp>
-      <p:sp>
-        <p:nvSpPr>
-          <p:cNvPr id="18" name="TextBox 17">
-            <a:extLst>
-              <a:ext uri="{FF2B5EF4-FFF2-40B4-BE49-F238E27FC236}">
-                <a16:creationId xmlns:a16="http://schemas.microsoft.com/office/drawing/2014/main" id="{F71B6236-3754-908C-B589-854D314AAC6E}"/>
-              </a:ext>
-            </a:extLst>
-          </p:cNvPr>
-          <p:cNvSpPr txBox="1"/>
+          <a:p>
+            <a:r>
+              <a:rPr lang="en-US" b="1" dirty="0" err="1">
+                <a:latin typeface="Times New Roman" panose="02020603050405020304" pitchFamily="18" charset="0"/>
+                <a:cs typeface="Times New Roman" panose="02020603050405020304" pitchFamily="18" charset="0"/>
+              </a:rPr>
+              <a:t>Rcode</a:t>
+            </a:r>
+            <a:r>
+              <a:rPr lang="en-US" b="1" dirty="0">
+                <a:latin typeface="Times New Roman" panose="02020603050405020304" pitchFamily="18" charset="0"/>
+                <a:cs typeface="Times New Roman" panose="02020603050405020304" pitchFamily="18" charset="0"/>
+              </a:rPr>
+              <a:t>:</a:t>
+            </a:r>
+            <a:endParaRPr lang="en-US" b="1" dirty="0">
+              <a:latin typeface="Times New Roman" panose="02020603050405020304" pitchFamily="18" charset="0"/>
+              <a:cs typeface="Times New Roman" panose="02020603050405020304" pitchFamily="18" charset="0"/>
+            </a:endParaRPr>
+          </a:p>
+          <a:p>
+            <a:endParaRPr lang="en-US" sz="1800" dirty="0">
+              <a:latin typeface="Times New Roman" panose="02020603050405020304" pitchFamily="18" charset="0"/>
+              <a:cs typeface="Times New Roman" panose="02020603050405020304" pitchFamily="18" charset="0"/>
+            </a:endParaRPr>
+          </a:p>
+          <a:p>
+            <a:endParaRPr lang="en-US" sz="1800" dirty="0">
+              <a:latin typeface="Times New Roman" panose="02020603050405020304" pitchFamily="18" charset="0"/>
+              <a:cs typeface="Times New Roman" panose="02020603050405020304" pitchFamily="18" charset="0"/>
+            </a:endParaRPr>
+          </a:p>
+        </p:txBody>
+      </p:sp>
+      <p:pic>
+        <p:nvPicPr>
+          <p:cNvPr id="11" name="Picture 10" descr="A screenshot of a computer program&#10;&#10;Description automatically generated"/>
+          <p:cNvPicPr>
+            <a:picLocks noChangeAspect="1"/>
+          </p:cNvPicPr>
           <p:nvPr/>
-        </p:nvSpPr>
+        </p:nvPicPr>
+        <p:blipFill>
+          <a:blip r:embed="rId1"/>
+          <a:stretch>
+            <a:fillRect/>
+          </a:stretch>
+        </p:blipFill>
         <p:spPr>
           <a:xfrm>
-            <a:off x="619431" y="1021854"/>
-            <a:ext cx="5358582" cy="369332"/>
+            <a:off x="1720645" y="2162364"/>
+            <a:ext cx="8603226" cy="3235546"/>
           </a:xfrm>
           <a:prstGeom prst="rect">
             <a:avLst/>
           </a:prstGeom>
-          <a:noFill/>
         </p:spPr>
-        <p:txBody>
-          <a:bodyPr wrap="square" rtlCol="0">
-            <a:spAutoFit/>
-          </a:bodyPr>
-          <a:lstStyle/>
-          <a:p>
-            <a:r>
-              <a:rPr lang="en-IN" b="1" dirty="0"/>
-              <a:t>Histogram Code with Bell Curve</a:t>
-            </a:r>
-          </a:p>
-        </p:txBody>
-      </p:sp>
+      </p:pic>
     </p:spTree>
-    <p:extLst>
-      <p:ext uri="{BB962C8B-B14F-4D97-AF65-F5344CB8AC3E}">
-        <p14:creationId xmlns:p14="http://schemas.microsoft.com/office/powerpoint/2010/main" val="324320051"/>
-      </p:ext>
-    </p:extLst>
   </p:cSld>
   <p:clrMapOvr>
     <a:masterClrMapping/>
@@ -3755,13 +3196,7 @@
       </p:grpSpPr>
       <p:sp>
         <p:nvSpPr>
-          <p:cNvPr id="4" name="Slide Number Placeholder 3">
-            <a:extLst>
-              <a:ext uri="{FF2B5EF4-FFF2-40B4-BE49-F238E27FC236}">
-                <a16:creationId xmlns:a16="http://schemas.microsoft.com/office/drawing/2014/main" id="{62554B41-DA84-93A9-CA6D-F9F13E3BB6F1}"/>
-              </a:ext>
-            </a:extLst>
-          </p:cNvPr>
+          <p:cNvPr id="4" name="Slide Number Placeholder 3"/>
           <p:cNvSpPr>
             <a:spLocks noGrp="1"/>
           </p:cNvSpPr>
@@ -3776,8 +3211,6 @@
           <a:p>
             <a:fld id="{E4D355CA-84B7-41B1-B164-8BB439CC7C6B}" type="slidenum">
               <a:rPr lang="en-GB" smtClean="0"/>
-              <a:pPr/>
-              <a:t>5</a:t>
             </a:fld>
             <a:endParaRPr lang="en-GB" dirty="0"/>
           </a:p>
@@ -3785,20 +3218,14 @@
       </p:sp>
       <p:sp>
         <p:nvSpPr>
-          <p:cNvPr id="10" name="TextBox 9">
-            <a:extLst>
-              <a:ext uri="{FF2B5EF4-FFF2-40B4-BE49-F238E27FC236}">
-                <a16:creationId xmlns:a16="http://schemas.microsoft.com/office/drawing/2014/main" id="{E81156BB-8280-AF11-1D1D-CBAD4807B8EF}"/>
-              </a:ext>
-            </a:extLst>
-          </p:cNvPr>
+          <p:cNvPr id="6" name="TextBox 5"/>
           <p:cNvSpPr txBox="1"/>
           <p:nvPr/>
         </p:nvSpPr>
         <p:spPr>
           <a:xfrm>
-            <a:off x="405010" y="4193679"/>
-            <a:ext cx="11381977" cy="646331"/>
+            <a:off x="540775" y="668593"/>
+            <a:ext cx="11287432" cy="1200329"/>
           </a:xfrm>
           <a:prstGeom prst="rect">
             <a:avLst/>
@@ -3811,48 +3238,106 @@
           </a:bodyPr>
           <a:lstStyle/>
           <a:p>
-            <a:pPr algn="ctr"/>
-            <a:r>
-              <a:rPr lang="en-US" dirty="0"/>
-              <a:t>Histogram is used to provide visualization of the distribution of Data. From the below result the data distribution is non-normal </a:t>
-            </a:r>
-            <a:r>
-              <a:rPr lang="en-IN" dirty="0"/>
-              <a:t>and the correlation test method we used is “Spearman” </a:t>
-            </a:r>
+            <a:r>
+              <a:rPr lang="en-US" dirty="0">
+                <a:latin typeface="Times New Roman" panose="02020603050405020304" pitchFamily="18" charset="0"/>
+                <a:cs typeface="Times New Roman" panose="02020603050405020304" pitchFamily="18" charset="0"/>
+              </a:rPr>
+              <a:t>Chi-Squared Test:</a:t>
+            </a:r>
+            <a:endParaRPr lang="en-US" dirty="0">
+              <a:latin typeface="Times New Roman" panose="02020603050405020304" pitchFamily="18" charset="0"/>
+              <a:cs typeface="Times New Roman" panose="02020603050405020304" pitchFamily="18" charset="0"/>
+            </a:endParaRPr>
+          </a:p>
+          <a:p>
+            <a:r>
+              <a:rPr lang="en-IN" sz="1800" kern="100" dirty="0">
+                <a:effectLst/>
+                <a:latin typeface="Times New Roman" panose="02020603050405020304" pitchFamily="18" charset="0"/>
+                <a:ea typeface="Aptos" panose="020B0004020202020204" pitchFamily="34" charset="0"/>
+                <a:cs typeface="Times New Roman" panose="02020603050405020304" pitchFamily="18" charset="0"/>
+              </a:rPr>
+              <a:t>A chi-square test is conducted by the script to determine if there is a significant association between fuel type and transmission type.</a:t>
+            </a:r>
+            <a:endParaRPr lang="en-IN" sz="1800" kern="100" dirty="0">
+              <a:effectLst/>
+              <a:latin typeface="Aptos" panose="020B0004020202020204" pitchFamily="34" charset="0"/>
+              <a:ea typeface="Aptos" panose="020B0004020202020204" pitchFamily="34" charset="0"/>
+              <a:cs typeface="Times New Roman" panose="02020603050405020304" pitchFamily="18" charset="0"/>
+            </a:endParaRPr>
+          </a:p>
+          <a:p>
+            <a:endParaRPr lang="en-IN" dirty="0"/>
           </a:p>
         </p:txBody>
       </p:sp>
       <p:pic>
         <p:nvPicPr>
-          <p:cNvPr id="11" name="Picture 10" descr="A diagram of a graph&#10;&#10;Description automatically generated">
-            <a:extLst>
-              <a:ext uri="{FF2B5EF4-FFF2-40B4-BE49-F238E27FC236}">
-                <a16:creationId xmlns:a16="http://schemas.microsoft.com/office/drawing/2014/main" id="{9446C83D-3C64-E3BC-0415-2D972762C9E2}"/>
-              </a:ext>
-            </a:extLst>
-          </p:cNvPr>
+          <p:cNvPr id="7" name="Picture 6" descr="A black text on a white background&#10;&#10;Description automatically generated"/>
           <p:cNvPicPr>
             <a:picLocks noChangeAspect="1"/>
           </p:cNvPicPr>
           <p:nvPr/>
         </p:nvPicPr>
         <p:blipFill>
-          <a:blip r:embed="rId2">
-            <a:extLst>
-              <a:ext uri="{28A0092B-C50C-407E-A947-70E740481C1C}">
-                <a14:useLocalDpi xmlns:a14="http://schemas.microsoft.com/office/drawing/2010/main" val="0"/>
-              </a:ext>
-            </a:extLst>
-          </a:blip>
+          <a:blip r:embed="rId1"/>
           <a:stretch>
             <a:fillRect/>
           </a:stretch>
         </p:blipFill>
         <p:spPr>
           <a:xfrm>
-            <a:off x="271462" y="906438"/>
-            <a:ext cx="11649075" cy="3171825"/>
+            <a:off x="3873910" y="1785335"/>
+            <a:ext cx="3429615" cy="997194"/>
+          </a:xfrm>
+          <a:prstGeom prst="rect">
+            <a:avLst/>
+          </a:prstGeom>
+        </p:spPr>
+      </p:pic>
+      <p:pic>
+        <p:nvPicPr>
+          <p:cNvPr id="8" name="Picture 7" descr="A white background with black text&#10;&#10;Description automatically generated"/>
+          <p:cNvPicPr>
+            <a:picLocks noChangeAspect="1"/>
+          </p:cNvPicPr>
+          <p:nvPr/>
+        </p:nvPicPr>
+        <p:blipFill>
+          <a:blip r:embed="rId2"/>
+          <a:stretch>
+            <a:fillRect/>
+          </a:stretch>
+        </p:blipFill>
+        <p:spPr>
+          <a:xfrm>
+            <a:off x="540775" y="3429000"/>
+            <a:ext cx="6762750" cy="1560079"/>
+          </a:xfrm>
+          <a:prstGeom prst="rect">
+            <a:avLst/>
+          </a:prstGeom>
+        </p:spPr>
+      </p:pic>
+      <p:pic>
+        <p:nvPicPr>
+          <p:cNvPr id="9" name="Picture 8" descr="A black text on a white background&#10;&#10;Description automatically generated"/>
+          <p:cNvPicPr>
+            <a:picLocks noChangeAspect="1"/>
+          </p:cNvPicPr>
+          <p:nvPr/>
+        </p:nvPicPr>
+        <p:blipFill>
+          <a:blip r:embed="rId3"/>
+          <a:stretch>
+            <a:fillRect/>
+          </a:stretch>
+        </p:blipFill>
+        <p:spPr>
+          <a:xfrm>
+            <a:off x="7531510" y="3519487"/>
+            <a:ext cx="3982064" cy="1386810"/>
           </a:xfrm>
           <a:prstGeom prst="rect">
             <a:avLst/>
@@ -3860,11 +3345,6 @@
         </p:spPr>
       </p:pic>
     </p:spTree>
-    <p:extLst>
-      <p:ext uri="{BB962C8B-B14F-4D97-AF65-F5344CB8AC3E}">
-        <p14:creationId xmlns:p14="http://schemas.microsoft.com/office/powerpoint/2010/main" val="2121442137"/>
-      </p:ext>
-    </p:extLst>
   </p:cSld>
   <p:clrMapOvr>
     <a:masterClrMapping/>
@@ -3889,1118 +3369,16 @@
           <a:chExt cx="0" cy="0"/>
         </a:xfrm>
       </p:grpSpPr>
-      <p:pic>
-        <p:nvPicPr>
-          <p:cNvPr id="3" name="Picture 2" descr="A graph with a line&#10;&#10;Description automatically generated">
-            <a:extLst>
-              <a:ext uri="{FF2B5EF4-FFF2-40B4-BE49-F238E27FC236}">
-                <a16:creationId xmlns:a16="http://schemas.microsoft.com/office/drawing/2014/main" id="{EB16FACF-3199-4C78-2A77-A2AE120C50A6}"/>
-              </a:ext>
-            </a:extLst>
-          </p:cNvPr>
-          <p:cNvPicPr>
-            <a:picLocks noChangeAspect="1"/>
-          </p:cNvPicPr>
+      <p:sp>
+        <p:nvSpPr>
+          <p:cNvPr id="7" name="TextBox 6"/>
+          <p:cNvSpPr txBox="1"/>
           <p:nvPr/>
-        </p:nvPicPr>
-        <p:blipFill>
-          <a:blip r:embed="rId2">
-            <a:extLst>
-              <a:ext uri="{28A0092B-C50C-407E-A947-70E740481C1C}">
-                <a14:useLocalDpi xmlns:a14="http://schemas.microsoft.com/office/drawing/2010/main" val="0"/>
-              </a:ext>
-            </a:extLst>
-          </a:blip>
-          <a:stretch>
-            <a:fillRect/>
-          </a:stretch>
-        </p:blipFill>
+        </p:nvSpPr>
         <p:spPr>
           <a:xfrm>
-            <a:off x="58991" y="599768"/>
-            <a:ext cx="11867958" cy="3153087"/>
-          </a:xfrm>
-          <a:prstGeom prst="rect">
-            <a:avLst/>
-          </a:prstGeom>
-        </p:spPr>
-      </p:pic>
-      <p:sp>
-        <p:nvSpPr>
-          <p:cNvPr id="4" name="TextBox 3">
-            <a:extLst>
-              <a:ext uri="{FF2B5EF4-FFF2-40B4-BE49-F238E27FC236}">
-                <a16:creationId xmlns:a16="http://schemas.microsoft.com/office/drawing/2014/main" id="{46163BAB-93BF-F08A-DDA2-BF9FA450B375}"/>
-              </a:ext>
-            </a:extLst>
-          </p:cNvPr>
-          <p:cNvSpPr txBox="1"/>
-          <p:nvPr/>
-        </p:nvSpPr>
-        <p:spPr>
-          <a:xfrm>
-            <a:off x="4385189" y="3619655"/>
-            <a:ext cx="3864076" cy="1754326"/>
-          </a:xfrm>
-          <a:prstGeom prst="rect">
-            <a:avLst/>
-          </a:prstGeom>
-          <a:noFill/>
-        </p:spPr>
-        <p:txBody>
-          <a:bodyPr wrap="square" rtlCol="0">
-            <a:spAutoFit/>
-          </a:bodyPr>
-          <a:lstStyle/>
-          <a:p>
-            <a:r>
-              <a:rPr lang="en-IN" sz="1200" dirty="0">
-                <a:latin typeface="Times New Roman" panose="02020603050405020304" pitchFamily="18" charset="0"/>
-                <a:cs typeface="Times New Roman" panose="02020603050405020304" pitchFamily="18" charset="0"/>
-              </a:rPr>
-              <a:t>Scatterplot2:</a:t>
-            </a:r>
-            <a:r>
-              <a:rPr lang="en-IN" sz="1200" dirty="0">
-                <a:solidFill>
-                  <a:srgbClr val="FF0000"/>
-                </a:solidFill>
-                <a:latin typeface="Times New Roman" panose="02020603050405020304" pitchFamily="18" charset="0"/>
-                <a:cs typeface="Times New Roman" panose="02020603050405020304" pitchFamily="18" charset="0"/>
-              </a:rPr>
-              <a:t>skoda_data&lt;-read.csv("skoda.csv")</a:t>
-            </a:r>
-          </a:p>
-          <a:p>
-            <a:r>
-              <a:rPr lang="en-IN" sz="1200" dirty="0">
-                <a:solidFill>
-                  <a:srgbClr val="FF0000"/>
-                </a:solidFill>
-                <a:latin typeface="Times New Roman" panose="02020603050405020304" pitchFamily="18" charset="0"/>
-                <a:cs typeface="Times New Roman" panose="02020603050405020304" pitchFamily="18" charset="0"/>
-              </a:rPr>
-              <a:t>hist(</a:t>
-            </a:r>
-            <a:r>
-              <a:rPr lang="en-IN" sz="1200" dirty="0" err="1">
-                <a:solidFill>
-                  <a:srgbClr val="FF0000"/>
-                </a:solidFill>
-                <a:latin typeface="Times New Roman" panose="02020603050405020304" pitchFamily="18" charset="0"/>
-                <a:cs typeface="Times New Roman" panose="02020603050405020304" pitchFamily="18" charset="0"/>
-              </a:rPr>
-              <a:t>skoda_data$price</a:t>
-            </a:r>
-            <a:r>
-              <a:rPr lang="en-IN" sz="1200" dirty="0">
-                <a:solidFill>
-                  <a:srgbClr val="FF0000"/>
-                </a:solidFill>
-                <a:latin typeface="Times New Roman" panose="02020603050405020304" pitchFamily="18" charset="0"/>
-                <a:cs typeface="Times New Roman" panose="02020603050405020304" pitchFamily="18" charset="0"/>
-              </a:rPr>
-              <a:t>, main = "Histogram of Resale Price")</a:t>
-            </a:r>
-          </a:p>
-          <a:p>
-            <a:r>
-              <a:rPr lang="en-IN" sz="1200" dirty="0" err="1">
-                <a:solidFill>
-                  <a:srgbClr val="FF0000"/>
-                </a:solidFill>
-                <a:latin typeface="Times New Roman" panose="02020603050405020304" pitchFamily="18" charset="0"/>
-                <a:cs typeface="Times New Roman" panose="02020603050405020304" pitchFamily="18" charset="0"/>
-              </a:rPr>
-              <a:t>cor.test</a:t>
-            </a:r>
-            <a:r>
-              <a:rPr lang="en-IN" sz="1200" dirty="0">
-                <a:solidFill>
-                  <a:srgbClr val="FF0000"/>
-                </a:solidFill>
-                <a:latin typeface="Times New Roman" panose="02020603050405020304" pitchFamily="18" charset="0"/>
-                <a:cs typeface="Times New Roman" panose="02020603050405020304" pitchFamily="18" charset="0"/>
-              </a:rPr>
-              <a:t>(</a:t>
-            </a:r>
-            <a:r>
-              <a:rPr lang="en-IN" sz="1200" dirty="0" err="1">
-                <a:solidFill>
-                  <a:srgbClr val="FF0000"/>
-                </a:solidFill>
-                <a:latin typeface="Times New Roman" panose="02020603050405020304" pitchFamily="18" charset="0"/>
-                <a:cs typeface="Times New Roman" panose="02020603050405020304" pitchFamily="18" charset="0"/>
-              </a:rPr>
-              <a:t>skoda_data$year</a:t>
-            </a:r>
-            <a:r>
-              <a:rPr lang="en-IN" sz="1200" dirty="0">
-                <a:solidFill>
-                  <a:srgbClr val="FF0000"/>
-                </a:solidFill>
-                <a:latin typeface="Times New Roman" panose="02020603050405020304" pitchFamily="18" charset="0"/>
-                <a:cs typeface="Times New Roman" panose="02020603050405020304" pitchFamily="18" charset="0"/>
-              </a:rPr>
-              <a:t>, </a:t>
-            </a:r>
-            <a:r>
-              <a:rPr lang="en-IN" sz="1200" dirty="0" err="1">
-                <a:solidFill>
-                  <a:srgbClr val="FF0000"/>
-                </a:solidFill>
-                <a:latin typeface="Times New Roman" panose="02020603050405020304" pitchFamily="18" charset="0"/>
-                <a:cs typeface="Times New Roman" panose="02020603050405020304" pitchFamily="18" charset="0"/>
-              </a:rPr>
-              <a:t>skoda_data$price</a:t>
-            </a:r>
-            <a:r>
-              <a:rPr lang="en-IN" sz="1200" dirty="0">
-                <a:solidFill>
-                  <a:srgbClr val="FF0000"/>
-                </a:solidFill>
-                <a:latin typeface="Times New Roman" panose="02020603050405020304" pitchFamily="18" charset="0"/>
-                <a:cs typeface="Times New Roman" panose="02020603050405020304" pitchFamily="18" charset="0"/>
-              </a:rPr>
-              <a:t>, method = "spearman", exact = FALSE)</a:t>
-            </a:r>
-          </a:p>
-          <a:p>
-            <a:r>
-              <a:rPr lang="en-IN" sz="1200" dirty="0">
-                <a:solidFill>
-                  <a:srgbClr val="FF0000"/>
-                </a:solidFill>
-                <a:latin typeface="Times New Roman" panose="02020603050405020304" pitchFamily="18" charset="0"/>
-                <a:cs typeface="Times New Roman" panose="02020603050405020304" pitchFamily="18" charset="0"/>
-              </a:rPr>
-              <a:t>plot(</a:t>
-            </a:r>
-            <a:r>
-              <a:rPr lang="en-IN" sz="1200" dirty="0" err="1">
-                <a:solidFill>
-                  <a:srgbClr val="FF0000"/>
-                </a:solidFill>
-                <a:latin typeface="Times New Roman" panose="02020603050405020304" pitchFamily="18" charset="0"/>
-                <a:cs typeface="Times New Roman" panose="02020603050405020304" pitchFamily="18" charset="0"/>
-              </a:rPr>
-              <a:t>skoda_data$year</a:t>
-            </a:r>
-            <a:r>
-              <a:rPr lang="en-IN" sz="1200" dirty="0">
-                <a:solidFill>
-                  <a:srgbClr val="FF0000"/>
-                </a:solidFill>
-                <a:latin typeface="Times New Roman" panose="02020603050405020304" pitchFamily="18" charset="0"/>
-                <a:cs typeface="Times New Roman" panose="02020603050405020304" pitchFamily="18" charset="0"/>
-              </a:rPr>
-              <a:t>, </a:t>
-            </a:r>
-            <a:r>
-              <a:rPr lang="en-IN" sz="1200" dirty="0" err="1">
-                <a:solidFill>
-                  <a:srgbClr val="FF0000"/>
-                </a:solidFill>
-                <a:latin typeface="Times New Roman" panose="02020603050405020304" pitchFamily="18" charset="0"/>
-                <a:cs typeface="Times New Roman" panose="02020603050405020304" pitchFamily="18" charset="0"/>
-              </a:rPr>
-              <a:t>skoda_data$price</a:t>
-            </a:r>
-            <a:r>
-              <a:rPr lang="en-IN" sz="1200" dirty="0">
-                <a:solidFill>
-                  <a:srgbClr val="FF0000"/>
-                </a:solidFill>
-                <a:latin typeface="Times New Roman" panose="02020603050405020304" pitchFamily="18" charset="0"/>
-                <a:cs typeface="Times New Roman" panose="02020603050405020304" pitchFamily="18" charset="0"/>
-              </a:rPr>
-              <a:t>, </a:t>
-            </a:r>
-            <a:r>
-              <a:rPr lang="en-IN" sz="1200" dirty="0" err="1">
-                <a:solidFill>
-                  <a:srgbClr val="FF0000"/>
-                </a:solidFill>
-                <a:latin typeface="Times New Roman" panose="02020603050405020304" pitchFamily="18" charset="0"/>
-                <a:cs typeface="Times New Roman" panose="02020603050405020304" pitchFamily="18" charset="0"/>
-              </a:rPr>
-              <a:t>xlab</a:t>
-            </a:r>
-            <a:r>
-              <a:rPr lang="en-IN" sz="1200" dirty="0">
-                <a:solidFill>
-                  <a:srgbClr val="FF0000"/>
-                </a:solidFill>
-                <a:latin typeface="Times New Roman" panose="02020603050405020304" pitchFamily="18" charset="0"/>
-                <a:cs typeface="Times New Roman" panose="02020603050405020304" pitchFamily="18" charset="0"/>
-              </a:rPr>
-              <a:t> = "year of the car make", </a:t>
-            </a:r>
-            <a:r>
-              <a:rPr lang="en-IN" sz="1200" dirty="0" err="1">
-                <a:solidFill>
-                  <a:srgbClr val="FF0000"/>
-                </a:solidFill>
-                <a:latin typeface="Times New Roman" panose="02020603050405020304" pitchFamily="18" charset="0"/>
-                <a:cs typeface="Times New Roman" panose="02020603050405020304" pitchFamily="18" charset="0"/>
-              </a:rPr>
-              <a:t>ylab</a:t>
-            </a:r>
-            <a:r>
-              <a:rPr lang="en-IN" sz="1200" dirty="0">
-                <a:solidFill>
-                  <a:srgbClr val="FF0000"/>
-                </a:solidFill>
-                <a:latin typeface="Times New Roman" panose="02020603050405020304" pitchFamily="18" charset="0"/>
-                <a:cs typeface="Times New Roman" panose="02020603050405020304" pitchFamily="18" charset="0"/>
-              </a:rPr>
-              <a:t> = "Resale Price", main = "Scatterplot of correlation between price and year")</a:t>
-            </a:r>
-          </a:p>
-          <a:p>
-            <a:r>
-              <a:rPr lang="en-IN" sz="1200" dirty="0" err="1">
-                <a:solidFill>
-                  <a:srgbClr val="FF0000"/>
-                </a:solidFill>
-                <a:latin typeface="Times New Roman" panose="02020603050405020304" pitchFamily="18" charset="0"/>
-                <a:cs typeface="Times New Roman" panose="02020603050405020304" pitchFamily="18" charset="0"/>
-              </a:rPr>
-              <a:t>abline</a:t>
-            </a:r>
-            <a:r>
-              <a:rPr lang="en-IN" sz="1200" dirty="0">
-                <a:solidFill>
-                  <a:srgbClr val="FF0000"/>
-                </a:solidFill>
-                <a:latin typeface="Times New Roman" panose="02020603050405020304" pitchFamily="18" charset="0"/>
-                <a:cs typeface="Times New Roman" panose="02020603050405020304" pitchFamily="18" charset="0"/>
-              </a:rPr>
-              <a:t>(</a:t>
-            </a:r>
-            <a:r>
-              <a:rPr lang="en-IN" sz="1200" dirty="0" err="1">
-                <a:solidFill>
-                  <a:srgbClr val="FF0000"/>
-                </a:solidFill>
-                <a:latin typeface="Times New Roman" panose="02020603050405020304" pitchFamily="18" charset="0"/>
-                <a:cs typeface="Times New Roman" panose="02020603050405020304" pitchFamily="18" charset="0"/>
-              </a:rPr>
-              <a:t>lm</a:t>
-            </a:r>
-            <a:r>
-              <a:rPr lang="en-IN" sz="1200" dirty="0">
-                <a:solidFill>
-                  <a:srgbClr val="FF0000"/>
-                </a:solidFill>
-                <a:latin typeface="Times New Roman" panose="02020603050405020304" pitchFamily="18" charset="0"/>
-                <a:cs typeface="Times New Roman" panose="02020603050405020304" pitchFamily="18" charset="0"/>
-              </a:rPr>
-              <a:t>(</a:t>
-            </a:r>
-            <a:r>
-              <a:rPr lang="en-IN" sz="1200" dirty="0" err="1">
-                <a:solidFill>
-                  <a:srgbClr val="FF0000"/>
-                </a:solidFill>
-                <a:latin typeface="Times New Roman" panose="02020603050405020304" pitchFamily="18" charset="0"/>
-                <a:cs typeface="Times New Roman" panose="02020603050405020304" pitchFamily="18" charset="0"/>
-              </a:rPr>
-              <a:t>skoda_data$price</a:t>
-            </a:r>
-            <a:r>
-              <a:rPr lang="en-IN" sz="1200" dirty="0">
-                <a:solidFill>
-                  <a:srgbClr val="FF0000"/>
-                </a:solidFill>
-                <a:latin typeface="Times New Roman" panose="02020603050405020304" pitchFamily="18" charset="0"/>
-                <a:cs typeface="Times New Roman" panose="02020603050405020304" pitchFamily="18" charset="0"/>
-              </a:rPr>
-              <a:t> ~ </a:t>
-            </a:r>
-            <a:r>
-              <a:rPr lang="en-IN" sz="1200" dirty="0" err="1">
-                <a:solidFill>
-                  <a:srgbClr val="FF0000"/>
-                </a:solidFill>
-                <a:latin typeface="Times New Roman" panose="02020603050405020304" pitchFamily="18" charset="0"/>
-                <a:cs typeface="Times New Roman" panose="02020603050405020304" pitchFamily="18" charset="0"/>
-              </a:rPr>
-              <a:t>skoda_data$year</a:t>
-            </a:r>
-            <a:r>
-              <a:rPr lang="en-IN" sz="1200" dirty="0">
-                <a:solidFill>
-                  <a:srgbClr val="FF0000"/>
-                </a:solidFill>
-                <a:latin typeface="Times New Roman" panose="02020603050405020304" pitchFamily="18" charset="0"/>
-                <a:cs typeface="Times New Roman" panose="02020603050405020304" pitchFamily="18" charset="0"/>
-              </a:rPr>
-              <a:t>), col = "green")</a:t>
-            </a:r>
-          </a:p>
-        </p:txBody>
-      </p:sp>
-      <p:sp>
-        <p:nvSpPr>
-          <p:cNvPr id="14" name="TextBox 13">
-            <a:extLst>
-              <a:ext uri="{FF2B5EF4-FFF2-40B4-BE49-F238E27FC236}">
-                <a16:creationId xmlns:a16="http://schemas.microsoft.com/office/drawing/2014/main" id="{BA5714C7-1BBD-7CAA-FD05-4AFB7F1986A1}"/>
-              </a:ext>
-            </a:extLst>
-          </p:cNvPr>
-          <p:cNvSpPr txBox="1"/>
-          <p:nvPr/>
-        </p:nvSpPr>
-        <p:spPr>
-          <a:xfrm>
-            <a:off x="265051" y="3527322"/>
-            <a:ext cx="4198795" cy="1938992"/>
-          </a:xfrm>
-          <a:prstGeom prst="rect">
-            <a:avLst/>
-          </a:prstGeom>
-          <a:noFill/>
-        </p:spPr>
-        <p:txBody>
-          <a:bodyPr wrap="square">
-            <a:spAutoFit/>
-          </a:bodyPr>
-          <a:lstStyle/>
-          <a:p>
-            <a:r>
-              <a:rPr lang="en-IN" sz="1200" dirty="0">
-                <a:latin typeface="Times New Roman" panose="02020603050405020304" pitchFamily="18" charset="0"/>
-                <a:cs typeface="Times New Roman" panose="02020603050405020304" pitchFamily="18" charset="0"/>
-              </a:rPr>
-              <a:t>Scatterplot1:</a:t>
-            </a:r>
-            <a:r>
-              <a:rPr lang="en-IN" sz="1200" dirty="0">
-                <a:solidFill>
-                  <a:srgbClr val="FF0000"/>
-                </a:solidFill>
-                <a:latin typeface="Times New Roman" panose="02020603050405020304" pitchFamily="18" charset="0"/>
-                <a:cs typeface="Times New Roman" panose="02020603050405020304" pitchFamily="18" charset="0"/>
-              </a:rPr>
-              <a:t>skoda_data&lt;-read.csv("skoda.csv")</a:t>
-            </a:r>
-          </a:p>
-          <a:p>
-            <a:r>
-              <a:rPr lang="en-IN" sz="1200" dirty="0">
-                <a:solidFill>
-                  <a:srgbClr val="FF0000"/>
-                </a:solidFill>
-                <a:latin typeface="Times New Roman" panose="02020603050405020304" pitchFamily="18" charset="0"/>
-                <a:cs typeface="Times New Roman" panose="02020603050405020304" pitchFamily="18" charset="0"/>
-              </a:rPr>
-              <a:t>hist(</a:t>
-            </a:r>
-            <a:r>
-              <a:rPr lang="en-IN" sz="1200" dirty="0" err="1">
-                <a:solidFill>
-                  <a:srgbClr val="FF0000"/>
-                </a:solidFill>
-                <a:latin typeface="Times New Roman" panose="02020603050405020304" pitchFamily="18" charset="0"/>
-                <a:cs typeface="Times New Roman" panose="02020603050405020304" pitchFamily="18" charset="0"/>
-              </a:rPr>
-              <a:t>skoda_data$price</a:t>
-            </a:r>
-            <a:r>
-              <a:rPr lang="en-IN" sz="1200" dirty="0">
-                <a:solidFill>
-                  <a:srgbClr val="FF0000"/>
-                </a:solidFill>
-                <a:latin typeface="Times New Roman" panose="02020603050405020304" pitchFamily="18" charset="0"/>
-                <a:cs typeface="Times New Roman" panose="02020603050405020304" pitchFamily="18" charset="0"/>
-              </a:rPr>
-              <a:t>, main = "Histogram of Resale Price")</a:t>
-            </a:r>
-          </a:p>
-          <a:p>
-            <a:r>
-              <a:rPr lang="en-IN" sz="1200" dirty="0" err="1">
-                <a:solidFill>
-                  <a:srgbClr val="FF0000"/>
-                </a:solidFill>
-                <a:latin typeface="Times New Roman" panose="02020603050405020304" pitchFamily="18" charset="0"/>
-                <a:cs typeface="Times New Roman" panose="02020603050405020304" pitchFamily="18" charset="0"/>
-              </a:rPr>
-              <a:t>cor.test</a:t>
-            </a:r>
-            <a:r>
-              <a:rPr lang="en-IN" sz="1200" dirty="0">
-                <a:solidFill>
-                  <a:srgbClr val="FF0000"/>
-                </a:solidFill>
-                <a:latin typeface="Times New Roman" panose="02020603050405020304" pitchFamily="18" charset="0"/>
-                <a:cs typeface="Times New Roman" panose="02020603050405020304" pitchFamily="18" charset="0"/>
-              </a:rPr>
-              <a:t>(</a:t>
-            </a:r>
-            <a:r>
-              <a:rPr lang="en-IN" sz="1200" dirty="0" err="1">
-                <a:solidFill>
-                  <a:srgbClr val="FF0000"/>
-                </a:solidFill>
-                <a:latin typeface="Times New Roman" panose="02020603050405020304" pitchFamily="18" charset="0"/>
-                <a:cs typeface="Times New Roman" panose="02020603050405020304" pitchFamily="18" charset="0"/>
-              </a:rPr>
-              <a:t>skoda_data$engineSize</a:t>
-            </a:r>
-            <a:r>
-              <a:rPr lang="en-IN" sz="1200" dirty="0">
-                <a:solidFill>
-                  <a:srgbClr val="FF0000"/>
-                </a:solidFill>
-                <a:latin typeface="Times New Roman" panose="02020603050405020304" pitchFamily="18" charset="0"/>
-                <a:cs typeface="Times New Roman" panose="02020603050405020304" pitchFamily="18" charset="0"/>
-              </a:rPr>
-              <a:t>, </a:t>
-            </a:r>
-            <a:r>
-              <a:rPr lang="en-IN" sz="1200" dirty="0" err="1">
-                <a:solidFill>
-                  <a:srgbClr val="FF0000"/>
-                </a:solidFill>
-                <a:latin typeface="Times New Roman" panose="02020603050405020304" pitchFamily="18" charset="0"/>
-                <a:cs typeface="Times New Roman" panose="02020603050405020304" pitchFamily="18" charset="0"/>
-              </a:rPr>
-              <a:t>skoda_data$price</a:t>
-            </a:r>
-            <a:r>
-              <a:rPr lang="en-IN" sz="1200" dirty="0">
-                <a:solidFill>
-                  <a:srgbClr val="FF0000"/>
-                </a:solidFill>
-                <a:latin typeface="Times New Roman" panose="02020603050405020304" pitchFamily="18" charset="0"/>
-                <a:cs typeface="Times New Roman" panose="02020603050405020304" pitchFamily="18" charset="0"/>
-              </a:rPr>
-              <a:t>, method = "spearman", exact = FALSE)</a:t>
-            </a:r>
-          </a:p>
-          <a:p>
-            <a:r>
-              <a:rPr lang="en-IN" sz="1200" dirty="0">
-                <a:solidFill>
-                  <a:srgbClr val="FF0000"/>
-                </a:solidFill>
-                <a:latin typeface="Times New Roman" panose="02020603050405020304" pitchFamily="18" charset="0"/>
-                <a:cs typeface="Times New Roman" panose="02020603050405020304" pitchFamily="18" charset="0"/>
-              </a:rPr>
-              <a:t>plot(</a:t>
-            </a:r>
-            <a:r>
-              <a:rPr lang="en-IN" sz="1200" dirty="0" err="1">
-                <a:solidFill>
-                  <a:srgbClr val="FF0000"/>
-                </a:solidFill>
-                <a:latin typeface="Times New Roman" panose="02020603050405020304" pitchFamily="18" charset="0"/>
-                <a:cs typeface="Times New Roman" panose="02020603050405020304" pitchFamily="18" charset="0"/>
-              </a:rPr>
-              <a:t>skoda_data$engineSize</a:t>
-            </a:r>
-            <a:r>
-              <a:rPr lang="en-IN" sz="1200" dirty="0">
-                <a:solidFill>
-                  <a:srgbClr val="FF0000"/>
-                </a:solidFill>
-                <a:latin typeface="Times New Roman" panose="02020603050405020304" pitchFamily="18" charset="0"/>
-                <a:cs typeface="Times New Roman" panose="02020603050405020304" pitchFamily="18" charset="0"/>
-              </a:rPr>
-              <a:t>, </a:t>
-            </a:r>
-            <a:r>
-              <a:rPr lang="en-IN" sz="1200" dirty="0" err="1">
-                <a:solidFill>
-                  <a:srgbClr val="FF0000"/>
-                </a:solidFill>
-                <a:latin typeface="Times New Roman" panose="02020603050405020304" pitchFamily="18" charset="0"/>
-                <a:cs typeface="Times New Roman" panose="02020603050405020304" pitchFamily="18" charset="0"/>
-              </a:rPr>
-              <a:t>skoda_data$price</a:t>
-            </a:r>
-            <a:r>
-              <a:rPr lang="en-IN" sz="1200" dirty="0">
-                <a:solidFill>
-                  <a:srgbClr val="FF0000"/>
-                </a:solidFill>
-                <a:latin typeface="Times New Roman" panose="02020603050405020304" pitchFamily="18" charset="0"/>
-                <a:cs typeface="Times New Roman" panose="02020603050405020304" pitchFamily="18" charset="0"/>
-              </a:rPr>
-              <a:t>, </a:t>
-            </a:r>
-            <a:r>
-              <a:rPr lang="en-IN" sz="1200" dirty="0" err="1">
-                <a:solidFill>
-                  <a:srgbClr val="FF0000"/>
-                </a:solidFill>
-                <a:latin typeface="Times New Roman" panose="02020603050405020304" pitchFamily="18" charset="0"/>
-                <a:cs typeface="Times New Roman" panose="02020603050405020304" pitchFamily="18" charset="0"/>
-              </a:rPr>
-              <a:t>xlab</a:t>
-            </a:r>
-            <a:r>
-              <a:rPr lang="en-IN" sz="1200" dirty="0">
-                <a:solidFill>
-                  <a:srgbClr val="FF0000"/>
-                </a:solidFill>
-                <a:latin typeface="Times New Roman" panose="02020603050405020304" pitchFamily="18" charset="0"/>
-                <a:cs typeface="Times New Roman" panose="02020603050405020304" pitchFamily="18" charset="0"/>
-              </a:rPr>
-              <a:t> = "</a:t>
-            </a:r>
-            <a:r>
-              <a:rPr lang="en-IN" sz="1200" dirty="0" err="1">
-                <a:solidFill>
-                  <a:srgbClr val="FF0000"/>
-                </a:solidFill>
-                <a:latin typeface="Times New Roman" panose="02020603050405020304" pitchFamily="18" charset="0"/>
-                <a:cs typeface="Times New Roman" panose="02020603050405020304" pitchFamily="18" charset="0"/>
-              </a:rPr>
-              <a:t>engineSize</a:t>
-            </a:r>
-            <a:r>
-              <a:rPr lang="en-IN" sz="1200" dirty="0">
-                <a:solidFill>
-                  <a:srgbClr val="FF0000"/>
-                </a:solidFill>
-                <a:latin typeface="Times New Roman" panose="02020603050405020304" pitchFamily="18" charset="0"/>
-                <a:cs typeface="Times New Roman" panose="02020603050405020304" pitchFamily="18" charset="0"/>
-              </a:rPr>
-              <a:t> of the car", </a:t>
-            </a:r>
-            <a:r>
-              <a:rPr lang="en-IN" sz="1200" dirty="0" err="1">
-                <a:solidFill>
-                  <a:srgbClr val="FF0000"/>
-                </a:solidFill>
-                <a:latin typeface="Times New Roman" panose="02020603050405020304" pitchFamily="18" charset="0"/>
-                <a:cs typeface="Times New Roman" panose="02020603050405020304" pitchFamily="18" charset="0"/>
-              </a:rPr>
-              <a:t>ylab</a:t>
-            </a:r>
-            <a:r>
-              <a:rPr lang="en-IN" sz="1200" dirty="0">
-                <a:solidFill>
-                  <a:srgbClr val="FF0000"/>
-                </a:solidFill>
-                <a:latin typeface="Times New Roman" panose="02020603050405020304" pitchFamily="18" charset="0"/>
-                <a:cs typeface="Times New Roman" panose="02020603050405020304" pitchFamily="18" charset="0"/>
-              </a:rPr>
-              <a:t> = "Resale Price", main = "Scatterplot of correlation between </a:t>
-            </a:r>
-            <a:r>
-              <a:rPr lang="en-IN" sz="1200" dirty="0" err="1">
-                <a:solidFill>
-                  <a:srgbClr val="FF0000"/>
-                </a:solidFill>
-                <a:latin typeface="Times New Roman" panose="02020603050405020304" pitchFamily="18" charset="0"/>
-                <a:cs typeface="Times New Roman" panose="02020603050405020304" pitchFamily="18" charset="0"/>
-              </a:rPr>
-              <a:t>EngineSize</a:t>
-            </a:r>
-            <a:r>
-              <a:rPr lang="en-IN" sz="1200" dirty="0">
-                <a:solidFill>
-                  <a:srgbClr val="FF0000"/>
-                </a:solidFill>
-                <a:latin typeface="Times New Roman" panose="02020603050405020304" pitchFamily="18" charset="0"/>
-                <a:cs typeface="Times New Roman" panose="02020603050405020304" pitchFamily="18" charset="0"/>
-              </a:rPr>
-              <a:t> and Resale price")</a:t>
-            </a:r>
-          </a:p>
-          <a:p>
-            <a:r>
-              <a:rPr lang="en-IN" sz="1200" dirty="0" err="1">
-                <a:solidFill>
-                  <a:srgbClr val="FF0000"/>
-                </a:solidFill>
-                <a:latin typeface="Times New Roman" panose="02020603050405020304" pitchFamily="18" charset="0"/>
-                <a:cs typeface="Times New Roman" panose="02020603050405020304" pitchFamily="18" charset="0"/>
-              </a:rPr>
-              <a:t>abline</a:t>
-            </a:r>
-            <a:r>
-              <a:rPr lang="en-IN" sz="1200" dirty="0">
-                <a:solidFill>
-                  <a:srgbClr val="FF0000"/>
-                </a:solidFill>
-                <a:latin typeface="Times New Roman" panose="02020603050405020304" pitchFamily="18" charset="0"/>
-                <a:cs typeface="Times New Roman" panose="02020603050405020304" pitchFamily="18" charset="0"/>
-              </a:rPr>
-              <a:t>(</a:t>
-            </a:r>
-            <a:r>
-              <a:rPr lang="en-IN" sz="1200" dirty="0" err="1">
-                <a:solidFill>
-                  <a:srgbClr val="FF0000"/>
-                </a:solidFill>
-                <a:latin typeface="Times New Roman" panose="02020603050405020304" pitchFamily="18" charset="0"/>
-                <a:cs typeface="Times New Roman" panose="02020603050405020304" pitchFamily="18" charset="0"/>
-              </a:rPr>
-              <a:t>lm</a:t>
-            </a:r>
-            <a:r>
-              <a:rPr lang="en-IN" sz="1200" dirty="0">
-                <a:solidFill>
-                  <a:srgbClr val="FF0000"/>
-                </a:solidFill>
-                <a:latin typeface="Times New Roman" panose="02020603050405020304" pitchFamily="18" charset="0"/>
-                <a:cs typeface="Times New Roman" panose="02020603050405020304" pitchFamily="18" charset="0"/>
-              </a:rPr>
-              <a:t>(</a:t>
-            </a:r>
-            <a:r>
-              <a:rPr lang="en-IN" sz="1200" dirty="0" err="1">
-                <a:solidFill>
-                  <a:srgbClr val="FF0000"/>
-                </a:solidFill>
-                <a:latin typeface="Times New Roman" panose="02020603050405020304" pitchFamily="18" charset="0"/>
-                <a:cs typeface="Times New Roman" panose="02020603050405020304" pitchFamily="18" charset="0"/>
-              </a:rPr>
-              <a:t>skoda_data$price</a:t>
-            </a:r>
-            <a:r>
-              <a:rPr lang="en-IN" sz="1200" dirty="0">
-                <a:solidFill>
-                  <a:srgbClr val="FF0000"/>
-                </a:solidFill>
-                <a:latin typeface="Times New Roman" panose="02020603050405020304" pitchFamily="18" charset="0"/>
-                <a:cs typeface="Times New Roman" panose="02020603050405020304" pitchFamily="18" charset="0"/>
-              </a:rPr>
-              <a:t> ~ </a:t>
-            </a:r>
-            <a:r>
-              <a:rPr lang="en-IN" sz="1200" dirty="0" err="1">
-                <a:solidFill>
-                  <a:srgbClr val="FF0000"/>
-                </a:solidFill>
-                <a:latin typeface="Times New Roman" panose="02020603050405020304" pitchFamily="18" charset="0"/>
-                <a:cs typeface="Times New Roman" panose="02020603050405020304" pitchFamily="18" charset="0"/>
-              </a:rPr>
-              <a:t>skoda_data$engineSize</a:t>
-            </a:r>
-            <a:r>
-              <a:rPr lang="en-IN" sz="1200" dirty="0">
-                <a:solidFill>
-                  <a:srgbClr val="FF0000"/>
-                </a:solidFill>
-                <a:latin typeface="Times New Roman" panose="02020603050405020304" pitchFamily="18" charset="0"/>
-                <a:cs typeface="Times New Roman" panose="02020603050405020304" pitchFamily="18" charset="0"/>
-              </a:rPr>
-              <a:t>), col = "red")</a:t>
-            </a:r>
-          </a:p>
-        </p:txBody>
-      </p:sp>
-      <p:sp>
-        <p:nvSpPr>
-          <p:cNvPr id="18" name="TextBox 17">
-            <a:extLst>
-              <a:ext uri="{FF2B5EF4-FFF2-40B4-BE49-F238E27FC236}">
-                <a16:creationId xmlns:a16="http://schemas.microsoft.com/office/drawing/2014/main" id="{595B0022-375D-48C4-3369-211A8B570870}"/>
-              </a:ext>
-            </a:extLst>
-          </p:cNvPr>
-          <p:cNvSpPr txBox="1"/>
-          <p:nvPr/>
-        </p:nvSpPr>
-        <p:spPr>
-          <a:xfrm>
-            <a:off x="8249265" y="3527322"/>
-            <a:ext cx="3942735" cy="1754326"/>
-          </a:xfrm>
-          <a:prstGeom prst="rect">
-            <a:avLst/>
-          </a:prstGeom>
-          <a:noFill/>
-        </p:spPr>
-        <p:txBody>
-          <a:bodyPr wrap="square">
-            <a:spAutoFit/>
-          </a:bodyPr>
-          <a:lstStyle/>
-          <a:p>
-            <a:r>
-              <a:rPr lang="en-IN" sz="1200" dirty="0">
-                <a:latin typeface="Times New Roman" panose="02020603050405020304" pitchFamily="18" charset="0"/>
-                <a:cs typeface="Times New Roman" panose="02020603050405020304" pitchFamily="18" charset="0"/>
-              </a:rPr>
-              <a:t>Scatterplot3:</a:t>
-            </a:r>
-            <a:r>
-              <a:rPr lang="en-IN" sz="1200" dirty="0">
-                <a:solidFill>
-                  <a:srgbClr val="FF0000"/>
-                </a:solidFill>
-                <a:latin typeface="Times New Roman" panose="02020603050405020304" pitchFamily="18" charset="0"/>
-                <a:cs typeface="Times New Roman" panose="02020603050405020304" pitchFamily="18" charset="0"/>
-              </a:rPr>
-              <a:t>skoda_data&lt;-read.csv("skoda.csv")</a:t>
-            </a:r>
-          </a:p>
-          <a:p>
-            <a:r>
-              <a:rPr lang="en-IN" sz="1200" dirty="0">
-                <a:solidFill>
-                  <a:srgbClr val="FF0000"/>
-                </a:solidFill>
-                <a:latin typeface="Times New Roman" panose="02020603050405020304" pitchFamily="18" charset="0"/>
-                <a:cs typeface="Times New Roman" panose="02020603050405020304" pitchFamily="18" charset="0"/>
-              </a:rPr>
-              <a:t>hist(</a:t>
-            </a:r>
-            <a:r>
-              <a:rPr lang="en-IN" sz="1200" dirty="0" err="1">
-                <a:solidFill>
-                  <a:srgbClr val="FF0000"/>
-                </a:solidFill>
-                <a:latin typeface="Times New Roman" panose="02020603050405020304" pitchFamily="18" charset="0"/>
-                <a:cs typeface="Times New Roman" panose="02020603050405020304" pitchFamily="18" charset="0"/>
-              </a:rPr>
-              <a:t>skoda_data$price</a:t>
-            </a:r>
-            <a:r>
-              <a:rPr lang="en-IN" sz="1200" dirty="0">
-                <a:solidFill>
-                  <a:srgbClr val="FF0000"/>
-                </a:solidFill>
-                <a:latin typeface="Times New Roman" panose="02020603050405020304" pitchFamily="18" charset="0"/>
-                <a:cs typeface="Times New Roman" panose="02020603050405020304" pitchFamily="18" charset="0"/>
-              </a:rPr>
-              <a:t>, main = "Histogram of Resale Price")</a:t>
-            </a:r>
-          </a:p>
-          <a:p>
-            <a:r>
-              <a:rPr lang="en-IN" sz="1200" dirty="0" err="1">
-                <a:solidFill>
-                  <a:srgbClr val="FF0000"/>
-                </a:solidFill>
-                <a:latin typeface="Times New Roman" panose="02020603050405020304" pitchFamily="18" charset="0"/>
-                <a:cs typeface="Times New Roman" panose="02020603050405020304" pitchFamily="18" charset="0"/>
-              </a:rPr>
-              <a:t>cor.test</a:t>
-            </a:r>
-            <a:r>
-              <a:rPr lang="en-IN" sz="1200" dirty="0">
-                <a:solidFill>
-                  <a:srgbClr val="FF0000"/>
-                </a:solidFill>
-                <a:latin typeface="Times New Roman" panose="02020603050405020304" pitchFamily="18" charset="0"/>
-                <a:cs typeface="Times New Roman" panose="02020603050405020304" pitchFamily="18" charset="0"/>
-              </a:rPr>
-              <a:t>(</a:t>
-            </a:r>
-            <a:r>
-              <a:rPr lang="en-IN" sz="1200" dirty="0" err="1">
-                <a:solidFill>
-                  <a:srgbClr val="FF0000"/>
-                </a:solidFill>
-                <a:latin typeface="Times New Roman" panose="02020603050405020304" pitchFamily="18" charset="0"/>
-                <a:cs typeface="Times New Roman" panose="02020603050405020304" pitchFamily="18" charset="0"/>
-              </a:rPr>
-              <a:t>skoda_data$mileage</a:t>
-            </a:r>
-            <a:r>
-              <a:rPr lang="en-IN" sz="1200" dirty="0">
-                <a:solidFill>
-                  <a:srgbClr val="FF0000"/>
-                </a:solidFill>
-                <a:latin typeface="Times New Roman" panose="02020603050405020304" pitchFamily="18" charset="0"/>
-                <a:cs typeface="Times New Roman" panose="02020603050405020304" pitchFamily="18" charset="0"/>
-              </a:rPr>
-              <a:t>, </a:t>
-            </a:r>
-            <a:r>
-              <a:rPr lang="en-IN" sz="1200" dirty="0" err="1">
-                <a:solidFill>
-                  <a:srgbClr val="FF0000"/>
-                </a:solidFill>
-                <a:latin typeface="Times New Roman" panose="02020603050405020304" pitchFamily="18" charset="0"/>
-                <a:cs typeface="Times New Roman" panose="02020603050405020304" pitchFamily="18" charset="0"/>
-              </a:rPr>
-              <a:t>skoda_data$price</a:t>
-            </a:r>
-            <a:r>
-              <a:rPr lang="en-IN" sz="1200" dirty="0">
-                <a:solidFill>
-                  <a:srgbClr val="FF0000"/>
-                </a:solidFill>
-                <a:latin typeface="Times New Roman" panose="02020603050405020304" pitchFamily="18" charset="0"/>
-                <a:cs typeface="Times New Roman" panose="02020603050405020304" pitchFamily="18" charset="0"/>
-              </a:rPr>
-              <a:t>, method = "spearman", exact = FALSE)</a:t>
-            </a:r>
-          </a:p>
-          <a:p>
-            <a:r>
-              <a:rPr lang="en-IN" sz="1200" dirty="0">
-                <a:solidFill>
-                  <a:srgbClr val="FF0000"/>
-                </a:solidFill>
-                <a:latin typeface="Times New Roman" panose="02020603050405020304" pitchFamily="18" charset="0"/>
-                <a:cs typeface="Times New Roman" panose="02020603050405020304" pitchFamily="18" charset="0"/>
-              </a:rPr>
-              <a:t>plot(</a:t>
-            </a:r>
-            <a:r>
-              <a:rPr lang="en-IN" sz="1200" dirty="0" err="1">
-                <a:solidFill>
-                  <a:srgbClr val="FF0000"/>
-                </a:solidFill>
-                <a:latin typeface="Times New Roman" panose="02020603050405020304" pitchFamily="18" charset="0"/>
-                <a:cs typeface="Times New Roman" panose="02020603050405020304" pitchFamily="18" charset="0"/>
-              </a:rPr>
-              <a:t>skoda_data$mileage</a:t>
-            </a:r>
-            <a:r>
-              <a:rPr lang="en-IN" sz="1200" dirty="0">
-                <a:solidFill>
-                  <a:srgbClr val="FF0000"/>
-                </a:solidFill>
-                <a:latin typeface="Times New Roman" panose="02020603050405020304" pitchFamily="18" charset="0"/>
-                <a:cs typeface="Times New Roman" panose="02020603050405020304" pitchFamily="18" charset="0"/>
-              </a:rPr>
-              <a:t>, </a:t>
-            </a:r>
-            <a:r>
-              <a:rPr lang="en-IN" sz="1200" dirty="0" err="1">
-                <a:solidFill>
-                  <a:srgbClr val="FF0000"/>
-                </a:solidFill>
-                <a:latin typeface="Times New Roman" panose="02020603050405020304" pitchFamily="18" charset="0"/>
-                <a:cs typeface="Times New Roman" panose="02020603050405020304" pitchFamily="18" charset="0"/>
-              </a:rPr>
-              <a:t>skoda_data$price</a:t>
-            </a:r>
-            <a:r>
-              <a:rPr lang="en-IN" sz="1200" dirty="0">
-                <a:solidFill>
-                  <a:srgbClr val="FF0000"/>
-                </a:solidFill>
-                <a:latin typeface="Times New Roman" panose="02020603050405020304" pitchFamily="18" charset="0"/>
-                <a:cs typeface="Times New Roman" panose="02020603050405020304" pitchFamily="18" charset="0"/>
-              </a:rPr>
-              <a:t>, </a:t>
-            </a:r>
-            <a:r>
-              <a:rPr lang="en-IN" sz="1200" dirty="0" err="1">
-                <a:solidFill>
-                  <a:srgbClr val="FF0000"/>
-                </a:solidFill>
-                <a:latin typeface="Times New Roman" panose="02020603050405020304" pitchFamily="18" charset="0"/>
-                <a:cs typeface="Times New Roman" panose="02020603050405020304" pitchFamily="18" charset="0"/>
-              </a:rPr>
-              <a:t>xlab</a:t>
-            </a:r>
-            <a:r>
-              <a:rPr lang="en-IN" sz="1200" dirty="0">
-                <a:solidFill>
-                  <a:srgbClr val="FF0000"/>
-                </a:solidFill>
-                <a:latin typeface="Times New Roman" panose="02020603050405020304" pitchFamily="18" charset="0"/>
-                <a:cs typeface="Times New Roman" panose="02020603050405020304" pitchFamily="18" charset="0"/>
-              </a:rPr>
-              <a:t> = "mileage of the car", </a:t>
-            </a:r>
-            <a:r>
-              <a:rPr lang="en-IN" sz="1200" dirty="0" err="1">
-                <a:solidFill>
-                  <a:srgbClr val="FF0000"/>
-                </a:solidFill>
-                <a:latin typeface="Times New Roman" panose="02020603050405020304" pitchFamily="18" charset="0"/>
-                <a:cs typeface="Times New Roman" panose="02020603050405020304" pitchFamily="18" charset="0"/>
-              </a:rPr>
-              <a:t>ylab</a:t>
-            </a:r>
-            <a:r>
-              <a:rPr lang="en-IN" sz="1200" dirty="0">
-                <a:solidFill>
-                  <a:srgbClr val="FF0000"/>
-                </a:solidFill>
-                <a:latin typeface="Times New Roman" panose="02020603050405020304" pitchFamily="18" charset="0"/>
-                <a:cs typeface="Times New Roman" panose="02020603050405020304" pitchFamily="18" charset="0"/>
-              </a:rPr>
-              <a:t> = "Resale Price", main = "Scatterplot of correlation between mileage and Resale price")</a:t>
-            </a:r>
-          </a:p>
-          <a:p>
-            <a:r>
-              <a:rPr lang="en-IN" sz="1200" dirty="0" err="1">
-                <a:solidFill>
-                  <a:srgbClr val="FF0000"/>
-                </a:solidFill>
-                <a:latin typeface="Times New Roman" panose="02020603050405020304" pitchFamily="18" charset="0"/>
-                <a:cs typeface="Times New Roman" panose="02020603050405020304" pitchFamily="18" charset="0"/>
-              </a:rPr>
-              <a:t>abline</a:t>
-            </a:r>
-            <a:r>
-              <a:rPr lang="en-IN" sz="1200" dirty="0">
-                <a:solidFill>
-                  <a:srgbClr val="FF0000"/>
-                </a:solidFill>
-                <a:latin typeface="Times New Roman" panose="02020603050405020304" pitchFamily="18" charset="0"/>
-                <a:cs typeface="Times New Roman" panose="02020603050405020304" pitchFamily="18" charset="0"/>
-              </a:rPr>
-              <a:t>(</a:t>
-            </a:r>
-            <a:r>
-              <a:rPr lang="en-IN" sz="1200" dirty="0" err="1">
-                <a:solidFill>
-                  <a:srgbClr val="FF0000"/>
-                </a:solidFill>
-                <a:latin typeface="Times New Roman" panose="02020603050405020304" pitchFamily="18" charset="0"/>
-                <a:cs typeface="Times New Roman" panose="02020603050405020304" pitchFamily="18" charset="0"/>
-              </a:rPr>
-              <a:t>lm</a:t>
-            </a:r>
-            <a:r>
-              <a:rPr lang="en-IN" sz="1200" dirty="0">
-                <a:solidFill>
-                  <a:srgbClr val="FF0000"/>
-                </a:solidFill>
-                <a:latin typeface="Times New Roman" panose="02020603050405020304" pitchFamily="18" charset="0"/>
-                <a:cs typeface="Times New Roman" panose="02020603050405020304" pitchFamily="18" charset="0"/>
-              </a:rPr>
-              <a:t>(</a:t>
-            </a:r>
-            <a:r>
-              <a:rPr lang="en-IN" sz="1200" dirty="0" err="1">
-                <a:solidFill>
-                  <a:srgbClr val="FF0000"/>
-                </a:solidFill>
-                <a:latin typeface="Times New Roman" panose="02020603050405020304" pitchFamily="18" charset="0"/>
-                <a:cs typeface="Times New Roman" panose="02020603050405020304" pitchFamily="18" charset="0"/>
-              </a:rPr>
-              <a:t>skoda_data$price</a:t>
-            </a:r>
-            <a:r>
-              <a:rPr lang="en-IN" sz="1200" dirty="0">
-                <a:solidFill>
-                  <a:srgbClr val="FF0000"/>
-                </a:solidFill>
-                <a:latin typeface="Times New Roman" panose="02020603050405020304" pitchFamily="18" charset="0"/>
-                <a:cs typeface="Times New Roman" panose="02020603050405020304" pitchFamily="18" charset="0"/>
-              </a:rPr>
-              <a:t> ~ </a:t>
-            </a:r>
-            <a:r>
-              <a:rPr lang="en-IN" sz="1200" dirty="0" err="1">
-                <a:solidFill>
-                  <a:srgbClr val="FF0000"/>
-                </a:solidFill>
-                <a:latin typeface="Times New Roman" panose="02020603050405020304" pitchFamily="18" charset="0"/>
-                <a:cs typeface="Times New Roman" panose="02020603050405020304" pitchFamily="18" charset="0"/>
-              </a:rPr>
-              <a:t>skoda_data$mileage</a:t>
-            </a:r>
-            <a:r>
-              <a:rPr lang="en-IN" sz="1200" dirty="0">
-                <a:solidFill>
-                  <a:srgbClr val="FF0000"/>
-                </a:solidFill>
-                <a:latin typeface="Times New Roman" panose="02020603050405020304" pitchFamily="18" charset="0"/>
-                <a:cs typeface="Times New Roman" panose="02020603050405020304" pitchFamily="18" charset="0"/>
-              </a:rPr>
-              <a:t>), col = "blue")</a:t>
-            </a:r>
-          </a:p>
-        </p:txBody>
-      </p:sp>
-      <p:sp>
-        <p:nvSpPr>
-          <p:cNvPr id="2" name="TextBox 1">
-            <a:extLst>
-              <a:ext uri="{FF2B5EF4-FFF2-40B4-BE49-F238E27FC236}">
-                <a16:creationId xmlns:a16="http://schemas.microsoft.com/office/drawing/2014/main" id="{82237784-A3FF-F17E-43F3-E1EEA0494AE7}"/>
-              </a:ext>
-            </a:extLst>
-          </p:cNvPr>
-          <p:cNvSpPr txBox="1"/>
-          <p:nvPr/>
-        </p:nvSpPr>
-        <p:spPr>
-          <a:xfrm>
-            <a:off x="501444" y="276602"/>
-            <a:ext cx="5122606" cy="646331"/>
-          </a:xfrm>
-          <a:prstGeom prst="rect">
-            <a:avLst/>
-          </a:prstGeom>
-          <a:noFill/>
-        </p:spPr>
-        <p:txBody>
-          <a:bodyPr wrap="square" rtlCol="0">
-            <a:spAutoFit/>
-          </a:bodyPr>
-          <a:lstStyle/>
-          <a:p>
-            <a:r>
-              <a:rPr lang="en-IN" sz="1800" b="1" dirty="0"/>
-              <a:t>Correlation Analysis code “Spearman</a:t>
-            </a:r>
-            <a:r>
-              <a:rPr lang="en-IN" dirty="0"/>
-              <a:t>”:</a:t>
-            </a:r>
-          </a:p>
-          <a:p>
-            <a:endParaRPr lang="en-IN" dirty="0"/>
-          </a:p>
-        </p:txBody>
-      </p:sp>
-    </p:spTree>
-    <p:extLst>
-      <p:ext uri="{BB962C8B-B14F-4D97-AF65-F5344CB8AC3E}">
-        <p14:creationId xmlns:p14="http://schemas.microsoft.com/office/powerpoint/2010/main" val="1666145063"/>
-      </p:ext>
-    </p:extLst>
-  </p:cSld>
-  <p:clrMapOvr>
-    <a:masterClrMapping/>
-  </p:clrMapOvr>
-</p:sld>
-</file>
-
-<file path=ppt/slides/slide7.xml><?xml version="1.0" encoding="utf-8"?>
-<p:sld xmlns:a="http://schemas.openxmlformats.org/drawingml/2006/main" xmlns:r="http://schemas.openxmlformats.org/officeDocument/2006/relationships" xmlns:p="http://schemas.openxmlformats.org/presentationml/2006/main">
-  <p:cSld>
-    <p:spTree>
-      <p:nvGrpSpPr>
-        <p:cNvPr id="1" name=""/>
-        <p:cNvGrpSpPr/>
-        <p:nvPr/>
-      </p:nvGrpSpPr>
-      <p:grpSpPr>
-        <a:xfrm>
-          <a:off x="0" y="0"/>
-          <a:ext cx="0" cy="0"/>
-          <a:chOff x="0" y="0"/>
-          <a:chExt cx="0" cy="0"/>
-        </a:xfrm>
-      </p:grpSpPr>
-      <p:sp>
-        <p:nvSpPr>
-          <p:cNvPr id="7" name="TextBox 6">
-            <a:extLst>
-              <a:ext uri="{FF2B5EF4-FFF2-40B4-BE49-F238E27FC236}">
-                <a16:creationId xmlns:a16="http://schemas.microsoft.com/office/drawing/2014/main" id="{79FD56B3-0658-9788-8DF5-496DCD69A250}"/>
-              </a:ext>
-            </a:extLst>
-          </p:cNvPr>
-          <p:cNvSpPr txBox="1"/>
-          <p:nvPr/>
-        </p:nvSpPr>
-        <p:spPr>
-          <a:xfrm>
-            <a:off x="1605116" y="670052"/>
-            <a:ext cx="8981768" cy="4585871"/>
+            <a:off x="1496961" y="3039626"/>
+            <a:ext cx="8981768" cy="2339102"/>
           </a:xfrm>
           <a:prstGeom prst="rect">
             <a:avLst/>
@@ -5047,8 +3425,71 @@
                 <a:latin typeface="Times New Roman" panose="02020603050405020304" pitchFamily="18" charset="0"/>
                 <a:cs typeface="Times New Roman" panose="02020603050405020304" pitchFamily="18" charset="0"/>
               </a:rPr>
-              <a:t>The statistical outcome and the conclusion on how the independent factors of used car will significantly affect the price for a consumer to buy the used car and the trends can be observed from the report. The p-value of the used independent variables (year and engine size) gives a positive correlation with resale price. Where the variable mileage gives a negative correlation with resale price. Cars with least manufacture date and more engine size providing moderately positive correlation representing customers to buy them and keeping it budget friendly. Whereas Cars with less milage have higher prices and are observed to be providing a negative correlation.</a:t>
-            </a:r>
+              <a:t>The p-value output of the above test is extremely small hence reject the null hypothesis.</a:t>
+            </a:r>
+            <a:endParaRPr lang="en-US" dirty="0">
+              <a:latin typeface="Times New Roman" panose="02020603050405020304" pitchFamily="18" charset="0"/>
+              <a:cs typeface="Times New Roman" panose="02020603050405020304" pitchFamily="18" charset="0"/>
+            </a:endParaRPr>
+          </a:p>
+          <a:p>
+            <a:endParaRPr lang="en-US" dirty="0">
+              <a:latin typeface="Times New Roman" panose="02020603050405020304" pitchFamily="18" charset="0"/>
+              <a:cs typeface="Times New Roman" panose="02020603050405020304" pitchFamily="18" charset="0"/>
+            </a:endParaRPr>
+          </a:p>
+          <a:p>
+            <a:r>
+              <a:rPr lang="en-US" dirty="0">
+                <a:latin typeface="Times New Roman" panose="02020603050405020304" pitchFamily="18" charset="0"/>
+                <a:cs typeface="Times New Roman" panose="02020603050405020304" pitchFamily="18" charset="0"/>
+              </a:rPr>
+              <a:t>Percentages and Bar Plot:</a:t>
+            </a:r>
+            <a:endParaRPr lang="en-US" dirty="0">
+              <a:latin typeface="Times New Roman" panose="02020603050405020304" pitchFamily="18" charset="0"/>
+              <a:cs typeface="Times New Roman" panose="02020603050405020304" pitchFamily="18" charset="0"/>
+            </a:endParaRPr>
+          </a:p>
+          <a:p>
+            <a:r>
+              <a:rPr lang="en-US" dirty="0">
+                <a:latin typeface="Times New Roman" panose="02020603050405020304" pitchFamily="18" charset="0"/>
+                <a:cs typeface="Times New Roman" panose="02020603050405020304" pitchFamily="18" charset="0"/>
+              </a:rPr>
+              <a:t>Percentages are calculated using the prop(). Plotted the stacked bar using the </a:t>
+            </a:r>
+            <a:r>
+              <a:rPr lang="en-US" dirty="0" err="1">
+                <a:latin typeface="Times New Roman" panose="02020603050405020304" pitchFamily="18" charset="0"/>
+                <a:cs typeface="Times New Roman" panose="02020603050405020304" pitchFamily="18" charset="0"/>
+              </a:rPr>
+              <a:t>barplot</a:t>
+            </a:r>
+            <a:r>
+              <a:rPr lang="en-US" dirty="0">
+                <a:latin typeface="Times New Roman" panose="02020603050405020304" pitchFamily="18" charset="0"/>
+                <a:cs typeface="Times New Roman" panose="02020603050405020304" pitchFamily="18" charset="0"/>
+              </a:rPr>
+              <a:t>(). </a:t>
+            </a:r>
+            <a:br>
+              <a:rPr lang="en-US" dirty="0">
+                <a:latin typeface="Times New Roman" panose="02020603050405020304" pitchFamily="18" charset="0"/>
+                <a:cs typeface="Times New Roman" panose="02020603050405020304" pitchFamily="18" charset="0"/>
+              </a:rPr>
+            </a:br>
+            <a:r>
+              <a:rPr lang="en-US" dirty="0">
+                <a:latin typeface="Times New Roman" panose="02020603050405020304" pitchFamily="18" charset="0"/>
+                <a:cs typeface="Times New Roman" panose="02020603050405020304" pitchFamily="18" charset="0"/>
+              </a:rPr>
+              <a:t>The visualization plot proves that the proportions are markedly differ between diesel and petrol cars among manual and automatic transmission types.</a:t>
+            </a:r>
+            <a:endParaRPr lang="en-US" dirty="0">
+              <a:latin typeface="Times New Roman" panose="02020603050405020304" pitchFamily="18" charset="0"/>
+              <a:cs typeface="Times New Roman" panose="02020603050405020304" pitchFamily="18" charset="0"/>
+            </a:endParaRPr>
           </a:p>
           <a:p>
             <a:endParaRPr lang="en-US" sz="1000" dirty="0">
@@ -5056,71 +3497,33 @@
               <a:cs typeface="Times New Roman" panose="02020603050405020304" pitchFamily="18" charset="0"/>
             </a:endParaRPr>
           </a:p>
-          <a:p>
-            <a:endParaRPr lang="en-US" sz="1000" dirty="0">
-              <a:latin typeface="Times New Roman" panose="02020603050405020304" pitchFamily="18" charset="0"/>
-              <a:cs typeface="Times New Roman" panose="02020603050405020304" pitchFamily="18" charset="0"/>
-            </a:endParaRPr>
-          </a:p>
-          <a:p>
-            <a:r>
-              <a:rPr lang="en-IN" sz="1800" b="1" kern="100" dirty="0">
-                <a:solidFill>
-                  <a:srgbClr val="0F4761"/>
-                </a:solidFill>
-                <a:effectLst/>
-                <a:latin typeface="Times New Roman" panose="02020603050405020304" pitchFamily="18" charset="0"/>
-                <a:ea typeface="Aptos" panose="020B0004020202020204" pitchFamily="34" charset="0"/>
-                <a:cs typeface="Times New Roman" panose="02020603050405020304" pitchFamily="18" charset="0"/>
-              </a:rPr>
-              <a:t>Conclusion:</a:t>
-            </a:r>
-            <a:endParaRPr lang="en-US" sz="1000" dirty="0">
-              <a:latin typeface="Times New Roman" panose="02020603050405020304" pitchFamily="18" charset="0"/>
-              <a:cs typeface="Times New Roman" panose="02020603050405020304" pitchFamily="18" charset="0"/>
-            </a:endParaRPr>
-          </a:p>
-          <a:p>
-            <a:endParaRPr lang="en-US" sz="1000" dirty="0">
-              <a:latin typeface="Times New Roman" panose="02020603050405020304" pitchFamily="18" charset="0"/>
-              <a:cs typeface="Times New Roman" panose="02020603050405020304" pitchFamily="18" charset="0"/>
-            </a:endParaRPr>
-          </a:p>
-          <a:p>
-            <a:r>
-              <a:rPr lang="en-US" dirty="0">
-                <a:latin typeface="Times New Roman" panose="02020603050405020304" pitchFamily="18" charset="0"/>
-                <a:cs typeface="Times New Roman" panose="02020603050405020304" pitchFamily="18" charset="0"/>
-              </a:rPr>
-              <a:t>The report concludes in all the 3 cases, null hypothesis has been rejected stating that all three variables are significantly related to the resale price. Rejecting the null doesn’t really prove the H1 hypothesis but most of the cases it shows related. Which proves </a:t>
-            </a:r>
-            <a:r>
-              <a:rPr lang="en-US" dirty="0" err="1">
-                <a:latin typeface="Times New Roman" panose="02020603050405020304" pitchFamily="18" charset="0"/>
-                <a:cs typeface="Times New Roman" panose="02020603050405020304" pitchFamily="18" charset="0"/>
-              </a:rPr>
-              <a:t>thst</a:t>
-            </a:r>
-            <a:r>
-              <a:rPr lang="en-US" dirty="0">
-                <a:latin typeface="Times New Roman" panose="02020603050405020304" pitchFamily="18" charset="0"/>
-                <a:cs typeface="Times New Roman" panose="02020603050405020304" pitchFamily="18" charset="0"/>
-              </a:rPr>
-              <a:t> the factors of the choice do have a relationship with resale price.</a:t>
-            </a:r>
-            <a:endParaRPr lang="en-IN" dirty="0">
-              <a:latin typeface="Times New Roman" panose="02020603050405020304" pitchFamily="18" charset="0"/>
-              <a:cs typeface="Times New Roman" panose="02020603050405020304" pitchFamily="18" charset="0"/>
-            </a:endParaRPr>
-          </a:p>
-        </p:txBody>
-      </p:sp>
+        </p:txBody>
+      </p:sp>
+      <p:pic>
+        <p:nvPicPr>
+          <p:cNvPr id="2" name="Picture 1" descr="A diagram of fuel type proportions&#10;&#10;Description automatically generated"/>
+          <p:cNvPicPr>
+            <a:picLocks noChangeAspect="1"/>
+          </p:cNvPicPr>
+          <p:nvPr/>
+        </p:nvPicPr>
+        <p:blipFill>
+          <a:blip r:embed="rId1"/>
+          <a:stretch>
+            <a:fillRect/>
+          </a:stretch>
+        </p:blipFill>
+        <p:spPr>
+          <a:xfrm>
+            <a:off x="1713271" y="374241"/>
+            <a:ext cx="8629650" cy="2526275"/>
+          </a:xfrm>
+          <a:prstGeom prst="rect">
+            <a:avLst/>
+          </a:prstGeom>
+        </p:spPr>
+      </p:pic>
     </p:spTree>
-    <p:extLst>
-      <p:ext uri="{BB962C8B-B14F-4D97-AF65-F5344CB8AC3E}">
-        <p14:creationId xmlns:p14="http://schemas.microsoft.com/office/powerpoint/2010/main" val="1612391665"/>
-      </p:ext>
-    </p:extLst>
   </p:cSld>
   <p:clrMapOvr>
     <a:masterClrMapping/>
@@ -5171,7 +3574,7 @@
     </a:clrScheme>
     <a:fontScheme name="Office">
       <a:majorFont>
-        <a:latin typeface="Aptos Display" panose="02110004020202020204"/>
+        <a:latin typeface="Aptos Display"/>
         <a:ea typeface=""/>
         <a:cs typeface=""/>
         <a:font script="Jpan" typeface="游ゴシック Light"/>
@@ -5204,26 +3607,9 @@
         <a:font script="Viet" typeface="Times New Roman"/>
         <a:font script="Uigh" typeface="Microsoft Uighur"/>
         <a:font script="Geor" typeface="Sylfaen"/>
-        <a:font script="Armn" typeface="Arial"/>
-        <a:font script="Bugi" typeface="Leelawadee UI"/>
-        <a:font script="Bopo" typeface="Microsoft JhengHei"/>
-        <a:font script="Java" typeface="Javanese Text"/>
-        <a:font script="Lisu" typeface="Segoe UI"/>
-        <a:font script="Mymr" typeface="Myanmar Text"/>
-        <a:font script="Nkoo" typeface="Ebrima"/>
-        <a:font script="Olck" typeface="Nirmala UI"/>
-        <a:font script="Osma" typeface="Ebrima"/>
-        <a:font script="Phag" typeface="Phagspa"/>
-        <a:font script="Syrn" typeface="Estrangelo Edessa"/>
-        <a:font script="Syrj" typeface="Estrangelo Edessa"/>
-        <a:font script="Syre" typeface="Estrangelo Edessa"/>
-        <a:font script="Sora" typeface="Nirmala UI"/>
-        <a:font script="Tale" typeface="Microsoft Tai Le"/>
-        <a:font script="Talu" typeface="Microsoft New Tai Lue"/>
-        <a:font script="Tfng" typeface="Ebrima"/>
       </a:majorFont>
       <a:minorFont>
-        <a:latin typeface="Aptos" panose="02110004020202020204"/>
+        <a:latin typeface="Aptos"/>
         <a:ea typeface=""/>
         <a:cs typeface=""/>
         <a:font script="Jpan" typeface="游ゴシック"/>
@@ -5256,23 +3642,6 @@
         <a:font script="Viet" typeface="Arial"/>
         <a:font script="Uigh" typeface="Microsoft Uighur"/>
         <a:font script="Geor" typeface="Sylfaen"/>
-        <a:font script="Armn" typeface="Arial"/>
-        <a:font script="Bugi" typeface="Leelawadee UI"/>
-        <a:font script="Bopo" typeface="Microsoft JhengHei"/>
-        <a:font script="Java" typeface="Javanese Text"/>
-        <a:font script="Lisu" typeface="Segoe UI"/>
-        <a:font script="Mymr" typeface="Myanmar Text"/>
-        <a:font script="Nkoo" typeface="Ebrima"/>
-        <a:font script="Olck" typeface="Nirmala UI"/>
-        <a:font script="Osma" typeface="Ebrima"/>
-        <a:font script="Phag" typeface="Phagspa"/>
-        <a:font script="Syrn" typeface="Estrangelo Edessa"/>
-        <a:font script="Syrj" typeface="Estrangelo Edessa"/>
-        <a:font script="Syre" typeface="Estrangelo Edessa"/>
-        <a:font script="Sora" typeface="Nirmala UI"/>
-        <a:font script="Tale" typeface="Microsoft Tai Le"/>
-        <a:font script="Talu" typeface="Microsoft New Tai Lue"/>
-        <a:font script="Tfng" typeface="Ebrima"/>
       </a:minorFont>
     </a:fontScheme>
     <a:fmtScheme name="Office">
@@ -5434,10 +3803,9 @@
       </a:style>
     </a:lnDef>
   </a:objectDefaults>
-  <a:extraClrSchemeLst/>
   <a:extLst>
     <a:ext uri="{05A4C25C-085E-4340-85A3-A5531E510DB2}">
-      <thm15:themeFamily xmlns:thm15="http://schemas.microsoft.com/office/thememl/2012/main" name="Office Theme" id="{2E142A2C-CD16-42D6-873A-C26D2A0506FA}" vid="{1BDDFF52-6CD6-40A5-AB3C-68EB2F1E4D0A}"/>
+      <thm15:themeFamily xmlns:thm15="http://schemas.microsoft.com/office/thememl/2012/main" name="Office Theme" id="{62F939B6-93AF-4DB8-9C6B-D6C7DFDC589F}" vid="{4A3C46E8-61CC-4603-A589-7422A47A8E4A}"/>
     </a:ext>
   </a:extLst>
 </a:theme>
@@ -5486,7 +3854,7 @@
     </a:clrScheme>
     <a:fontScheme name="Office">
       <a:majorFont>
-        <a:latin typeface="Calibri Light" panose="020F0302020204030204"/>
+        <a:latin typeface="Calibri Light"/>
         <a:ea typeface=""/>
         <a:cs typeface=""/>
         <a:font script="Jpan" typeface="游ゴシック Light"/>
@@ -5519,26 +3887,9 @@
         <a:font script="Viet" typeface="Times New Roman"/>
         <a:font script="Uigh" typeface="Microsoft Uighur"/>
         <a:font script="Geor" typeface="Sylfaen"/>
-        <a:font script="Armn" typeface="Arial"/>
-        <a:font script="Bugi" typeface="Leelawadee UI"/>
-        <a:font script="Bopo" typeface="Microsoft JhengHei"/>
-        <a:font script="Java" typeface="Javanese Text"/>
-        <a:font script="Lisu" typeface="Segoe UI"/>
-        <a:font script="Mymr" typeface="Myanmar Text"/>
-        <a:font script="Nkoo" typeface="Ebrima"/>
-        <a:font script="Olck" typeface="Nirmala UI"/>
-        <a:font script="Osma" typeface="Ebrima"/>
-        <a:font script="Phag" typeface="Phagspa"/>
-        <a:font script="Syrn" typeface="Estrangelo Edessa"/>
-        <a:font script="Syrj" typeface="Estrangelo Edessa"/>
-        <a:font script="Syre" typeface="Estrangelo Edessa"/>
-        <a:font script="Sora" typeface="Nirmala UI"/>
-        <a:font script="Tale" typeface="Microsoft Tai Le"/>
-        <a:font script="Talu" typeface="Microsoft New Tai Lue"/>
-        <a:font script="Tfng" typeface="Ebrima"/>
       </a:majorFont>
       <a:minorFont>
-        <a:latin typeface="Calibri" panose="020F0502020204030204"/>
+        <a:latin typeface="Calibri"/>
         <a:ea typeface=""/>
         <a:cs typeface=""/>
         <a:font script="Jpan" typeface="游ゴシック"/>
@@ -5571,23 +3922,6 @@
         <a:font script="Viet" typeface="Arial"/>
         <a:font script="Uigh" typeface="Microsoft Uighur"/>
         <a:font script="Geor" typeface="Sylfaen"/>
-        <a:font script="Armn" typeface="Arial"/>
-        <a:font script="Bugi" typeface="Leelawadee UI"/>
-        <a:font script="Bopo" typeface="Microsoft JhengHei"/>
-        <a:font script="Java" typeface="Javanese Text"/>
-        <a:font script="Lisu" typeface="Segoe UI"/>
-        <a:font script="Mymr" typeface="Myanmar Text"/>
-        <a:font script="Nkoo" typeface="Ebrima"/>
-        <a:font script="Olck" typeface="Nirmala UI"/>
-        <a:font script="Osma" typeface="Ebrima"/>
-        <a:font script="Phag" typeface="Phagspa"/>
-        <a:font script="Syrn" typeface="Estrangelo Edessa"/>
-        <a:font script="Syrj" typeface="Estrangelo Edessa"/>
-        <a:font script="Syre" typeface="Estrangelo Edessa"/>
-        <a:font script="Sora" typeface="Nirmala UI"/>
-        <a:font script="Tale" typeface="Microsoft Tai Le"/>
-        <a:font script="Talu" typeface="Microsoft New Tai Lue"/>
-        <a:font script="Tfng" typeface="Ebrima"/>
       </a:minorFont>
     </a:fontScheme>
     <a:fmtScheme name="Office">
@@ -5728,8 +4062,6 @@
       </a:bgFillStyleLst>
     </a:fmtScheme>
   </a:themeElements>
-  <a:objectDefaults/>
-  <a:extraClrSchemeLst/>
   <a:extLst>
     <a:ext uri="{05A4C25C-085E-4340-85A3-A5531E510DB2}">
       <thm15:themeFamily xmlns:thm15="http://schemas.microsoft.com/office/thememl/2012/main" name="Office Theme" id="{62F939B6-93AF-4DB8-9C6B-D6C7DFDC589F}" vid="{4A3C46E8-61CC-4603-A589-7422A47A8E4A}"/>

</xml_diff>